<commit_message>
updated slides based upon usage in class
</commit_message>
<xml_diff>
--- a/models_comp_comm/documents/Models.pptx
+++ b/models_comp_comm/documents/Models.pptx
@@ -807,7 +807,7 @@
   <p:cSld>
     <p:spTree>
       <p:nvGrpSpPr>
-        <p:cNvPr id="117" name="Shape 117"/>
+        <p:cNvPr id="119" name="Shape 119"/>
         <p:cNvGrpSpPr/>
         <p:nvPr/>
       </p:nvGrpSpPr>
@@ -821,7 +821,7 @@
       </p:grpSpPr>
       <p:sp>
         <p:nvSpPr>
-          <p:cNvPr id="118" name="Google Shape;118;gecb262fc41_0_245:notes"/>
+          <p:cNvPr id="120" name="Google Shape;120;gecb262fc41_0_245:notes"/>
           <p:cNvSpPr/>
           <p:nvPr>
             <p:ph idx="2" type="sldImg"/>
@@ -856,7 +856,7 @@
       </p:sp>
       <p:sp>
         <p:nvSpPr>
-          <p:cNvPr id="119" name="Google Shape;119;gecb262fc41_0_245:notes"/>
+          <p:cNvPr id="121" name="Google Shape;121;gecb262fc41_0_245:notes"/>
           <p:cNvSpPr txBox="1"/>
           <p:nvPr>
             <p:ph idx="1" type="body"/>
@@ -906,7 +906,7 @@
   <p:cSld>
     <p:spTree>
       <p:nvGrpSpPr>
-        <p:cNvPr id="156" name="Shape 156"/>
+        <p:cNvPr id="158" name="Shape 158"/>
         <p:cNvGrpSpPr/>
         <p:nvPr/>
       </p:nvGrpSpPr>
@@ -920,7 +920,7 @@
       </p:grpSpPr>
       <p:sp>
         <p:nvSpPr>
-          <p:cNvPr id="157" name="Google Shape;157;gecb262fc41_0_283:notes"/>
+          <p:cNvPr id="159" name="Google Shape;159;gecb262fc41_0_283:notes"/>
           <p:cNvSpPr/>
           <p:nvPr>
             <p:ph idx="2" type="sldImg"/>
@@ -955,7 +955,7 @@
       </p:sp>
       <p:sp>
         <p:nvSpPr>
-          <p:cNvPr id="158" name="Google Shape;158;gecb262fc41_0_283:notes"/>
+          <p:cNvPr id="160" name="Google Shape;160;gecb262fc41_0_283:notes"/>
           <p:cNvSpPr txBox="1"/>
           <p:nvPr>
             <p:ph idx="1" type="body"/>
@@ -1005,7 +1005,7 @@
   <p:cSld>
     <p:spTree>
       <p:nvGrpSpPr>
-        <p:cNvPr id="201" name="Shape 201"/>
+        <p:cNvPr id="203" name="Shape 203"/>
         <p:cNvGrpSpPr/>
         <p:nvPr/>
       </p:nvGrpSpPr>
@@ -1019,7 +1019,7 @@
       </p:grpSpPr>
       <p:sp>
         <p:nvSpPr>
-          <p:cNvPr id="202" name="Google Shape;202;gecb262fc41_0_327:notes"/>
+          <p:cNvPr id="204" name="Google Shape;204;gecb262fc41_0_327:notes"/>
           <p:cNvSpPr/>
           <p:nvPr>
             <p:ph idx="2" type="sldImg"/>
@@ -1054,7 +1054,7 @@
       </p:sp>
       <p:sp>
         <p:nvSpPr>
-          <p:cNvPr id="203" name="Google Shape;203;gecb262fc41_0_327:notes"/>
+          <p:cNvPr id="205" name="Google Shape;205;gecb262fc41_0_327:notes"/>
           <p:cNvSpPr txBox="1"/>
           <p:nvPr>
             <p:ph idx="1" type="body"/>
@@ -1104,7 +1104,7 @@
   <p:cSld>
     <p:spTree>
       <p:nvGrpSpPr>
-        <p:cNvPr id="258" name="Shape 258"/>
+        <p:cNvPr id="260" name="Shape 260"/>
         <p:cNvGrpSpPr/>
         <p:nvPr/>
       </p:nvGrpSpPr>
@@ -1118,7 +1118,7 @@
       </p:grpSpPr>
       <p:sp>
         <p:nvSpPr>
-          <p:cNvPr id="259" name="Google Shape;259;gecb262fc41_0_383:notes"/>
+          <p:cNvPr id="261" name="Google Shape;261;gecb262fc41_0_383:notes"/>
           <p:cNvSpPr/>
           <p:nvPr>
             <p:ph idx="2" type="sldImg"/>
@@ -1153,7 +1153,7 @@
       </p:sp>
       <p:sp>
         <p:nvSpPr>
-          <p:cNvPr id="260" name="Google Shape;260;gecb262fc41_0_383:notes"/>
+          <p:cNvPr id="262" name="Google Shape;262;gecb262fc41_0_383:notes"/>
           <p:cNvSpPr txBox="1"/>
           <p:nvPr>
             <p:ph idx="1" type="body"/>
@@ -1203,7 +1203,7 @@
   <p:cSld>
     <p:spTree>
       <p:nvGrpSpPr>
-        <p:cNvPr id="309" name="Shape 309"/>
+        <p:cNvPr id="311" name="Shape 311"/>
         <p:cNvGrpSpPr/>
         <p:nvPr/>
       </p:nvGrpSpPr>
@@ -1217,7 +1217,7 @@
       </p:grpSpPr>
       <p:sp>
         <p:nvSpPr>
-          <p:cNvPr id="310" name="Google Shape;310;gecb262fc41_0_433:notes"/>
+          <p:cNvPr id="312" name="Google Shape;312;gecb262fc41_0_433:notes"/>
           <p:cNvSpPr/>
           <p:nvPr>
             <p:ph idx="2" type="sldImg"/>
@@ -1252,7 +1252,7 @@
       </p:sp>
       <p:sp>
         <p:nvSpPr>
-          <p:cNvPr id="311" name="Google Shape;311;gecb262fc41_0_433:notes"/>
+          <p:cNvPr id="313" name="Google Shape;313;gecb262fc41_0_433:notes"/>
           <p:cNvSpPr txBox="1"/>
           <p:nvPr>
             <p:ph idx="1" type="body"/>
@@ -1302,7 +1302,7 @@
   <p:cSld>
     <p:spTree>
       <p:nvGrpSpPr>
-        <p:cNvPr id="359" name="Shape 359"/>
+        <p:cNvPr id="361" name="Shape 361"/>
         <p:cNvGrpSpPr/>
         <p:nvPr/>
       </p:nvGrpSpPr>
@@ -1316,7 +1316,7 @@
       </p:grpSpPr>
       <p:sp>
         <p:nvSpPr>
-          <p:cNvPr id="360" name="Google Shape;360;gecb262fc41_0_482:notes"/>
+          <p:cNvPr id="362" name="Google Shape;362;gecb262fc41_0_482:notes"/>
           <p:cNvSpPr/>
           <p:nvPr>
             <p:ph idx="2" type="sldImg"/>
@@ -1351,7 +1351,7 @@
       </p:sp>
       <p:sp>
         <p:nvSpPr>
-          <p:cNvPr id="361" name="Google Shape;361;gecb262fc41_0_482:notes"/>
+          <p:cNvPr id="363" name="Google Shape;363;gecb262fc41_0_482:notes"/>
           <p:cNvSpPr txBox="1"/>
           <p:nvPr>
             <p:ph idx="1" type="body"/>
@@ -1401,7 +1401,7 @@
   <p:cSld>
     <p:spTree>
       <p:nvGrpSpPr>
-        <p:cNvPr id="368" name="Shape 368"/>
+        <p:cNvPr id="370" name="Shape 370"/>
         <p:cNvGrpSpPr/>
         <p:nvPr/>
       </p:nvGrpSpPr>
@@ -1415,7 +1415,7 @@
       </p:grpSpPr>
       <p:sp>
         <p:nvSpPr>
-          <p:cNvPr id="369" name="Google Shape;369;g10bcd46df6d_0_57:notes"/>
+          <p:cNvPr id="371" name="Google Shape;371;g10bcd46df6d_0_57:notes"/>
           <p:cNvSpPr/>
           <p:nvPr>
             <p:ph idx="2" type="sldImg"/>
@@ -1450,7 +1450,7 @@
       </p:sp>
       <p:sp>
         <p:nvSpPr>
-          <p:cNvPr id="370" name="Google Shape;370;g10bcd46df6d_0_57:notes"/>
+          <p:cNvPr id="372" name="Google Shape;372;g10bcd46df6d_0_57:notes"/>
           <p:cNvSpPr txBox="1"/>
           <p:nvPr>
             <p:ph idx="1" type="body"/>
@@ -1500,7 +1500,7 @@
   <p:cSld>
     <p:spTree>
       <p:nvGrpSpPr>
-        <p:cNvPr id="374" name="Shape 374"/>
+        <p:cNvPr id="376" name="Shape 376"/>
         <p:cNvGrpSpPr/>
         <p:nvPr/>
       </p:nvGrpSpPr>
@@ -1514,7 +1514,7 @@
       </p:grpSpPr>
       <p:sp>
         <p:nvSpPr>
-          <p:cNvPr id="375" name="Google Shape;375;g109098ecac2_0_1:notes"/>
+          <p:cNvPr id="377" name="Google Shape;377;g109098ecac2_0_1:notes"/>
           <p:cNvSpPr/>
           <p:nvPr>
             <p:ph idx="2" type="sldImg"/>
@@ -1549,7 +1549,7 @@
       </p:sp>
       <p:sp>
         <p:nvSpPr>
-          <p:cNvPr id="376" name="Google Shape;376;g109098ecac2_0_1:notes"/>
+          <p:cNvPr id="378" name="Google Shape;378;g109098ecac2_0_1:notes"/>
           <p:cNvSpPr txBox="1"/>
           <p:nvPr>
             <p:ph idx="1" type="body"/>
@@ -1599,7 +1599,7 @@
   <p:cSld>
     <p:spTree>
       <p:nvGrpSpPr>
-        <p:cNvPr id="381" name="Shape 381"/>
+        <p:cNvPr id="383" name="Shape 383"/>
         <p:cNvGrpSpPr/>
         <p:nvPr/>
       </p:nvGrpSpPr>
@@ -1613,7 +1613,7 @@
       </p:grpSpPr>
       <p:sp>
         <p:nvSpPr>
-          <p:cNvPr id="382" name="Google Shape;382;g109098ecac2_0_9:notes"/>
+          <p:cNvPr id="384" name="Google Shape;384;g109098ecac2_0_9:notes"/>
           <p:cNvSpPr/>
           <p:nvPr>
             <p:ph idx="2" type="sldImg"/>
@@ -1648,7 +1648,7 @@
       </p:sp>
       <p:sp>
         <p:nvSpPr>
-          <p:cNvPr id="383" name="Google Shape;383;g109098ecac2_0_9:notes"/>
+          <p:cNvPr id="385" name="Google Shape;385;g109098ecac2_0_9:notes"/>
           <p:cNvSpPr txBox="1"/>
           <p:nvPr>
             <p:ph idx="1" type="body"/>
@@ -2391,7 +2391,7 @@
   <p:cSld>
     <p:spTree>
       <p:nvGrpSpPr>
-        <p:cNvPr id="109" name="Shape 109"/>
+        <p:cNvPr id="111" name="Shape 111"/>
         <p:cNvGrpSpPr/>
         <p:nvPr/>
       </p:nvGrpSpPr>
@@ -2405,7 +2405,7 @@
       </p:grpSpPr>
       <p:sp>
         <p:nvSpPr>
-          <p:cNvPr id="110" name="Google Shape;110;gecb262fc41_0_188:notes"/>
+          <p:cNvPr id="112" name="Google Shape;112;gecb262fc41_0_188:notes"/>
           <p:cNvSpPr/>
           <p:nvPr>
             <p:ph idx="2" type="sldImg"/>
@@ -2440,7 +2440,7 @@
       </p:sp>
       <p:sp>
         <p:nvSpPr>
-          <p:cNvPr id="111" name="Google Shape;111;gecb262fc41_0_188:notes"/>
+          <p:cNvPr id="113" name="Google Shape;113;gecb262fc41_0_188:notes"/>
           <p:cNvSpPr txBox="1"/>
           <p:nvPr>
             <p:ph idx="1" type="body"/>
@@ -7447,7 +7447,7 @@
   <p:cSld>
     <p:spTree>
       <p:nvGrpSpPr>
-        <p:cNvPr id="120" name="Shape 120"/>
+        <p:cNvPr id="122" name="Shape 122"/>
         <p:cNvGrpSpPr/>
         <p:nvPr/>
       </p:nvGrpSpPr>
@@ -7461,7 +7461,7 @@
       </p:grpSpPr>
       <p:sp>
         <p:nvSpPr>
-          <p:cNvPr id="121" name="Google Shape;121;p22"/>
+          <p:cNvPr id="123" name="Google Shape;123;p22"/>
           <p:cNvSpPr txBox="1"/>
           <p:nvPr>
             <p:ph idx="1" type="body"/>
@@ -7602,7 +7602,7 @@
       </p:sp>
       <p:sp>
         <p:nvSpPr>
-          <p:cNvPr id="122" name="Google Shape;122;p22"/>
+          <p:cNvPr id="124" name="Google Shape;124;p22"/>
           <p:cNvSpPr/>
           <p:nvPr/>
         </p:nvSpPr>
@@ -7651,7 +7651,7 @@
       </p:sp>
       <p:sp>
         <p:nvSpPr>
-          <p:cNvPr id="123" name="Google Shape;123;p22"/>
+          <p:cNvPr id="125" name="Google Shape;125;p22"/>
           <p:cNvSpPr txBox="1"/>
           <p:nvPr>
             <p:ph type="title"/>
@@ -7691,7 +7691,7 @@
       </p:sp>
       <p:sp>
         <p:nvSpPr>
-          <p:cNvPr id="124" name="Google Shape;124;p22"/>
+          <p:cNvPr id="126" name="Google Shape;126;p22"/>
           <p:cNvSpPr/>
           <p:nvPr/>
         </p:nvSpPr>
@@ -7740,7 +7740,7 @@
       </p:sp>
       <p:sp>
         <p:nvSpPr>
-          <p:cNvPr id="125" name="Google Shape;125;p22"/>
+          <p:cNvPr id="127" name="Google Shape;127;p22"/>
           <p:cNvSpPr/>
           <p:nvPr/>
         </p:nvSpPr>
@@ -7790,7 +7790,7 @@
       </p:sp>
       <p:sp>
         <p:nvSpPr>
-          <p:cNvPr id="126" name="Google Shape;126;p22"/>
+          <p:cNvPr id="128" name="Google Shape;128;p22"/>
           <p:cNvSpPr/>
           <p:nvPr/>
         </p:nvSpPr>
@@ -7840,7 +7840,7 @@
       </p:sp>
       <p:sp>
         <p:nvSpPr>
-          <p:cNvPr id="127" name="Google Shape;127;p22"/>
+          <p:cNvPr id="129" name="Google Shape;129;p22"/>
           <p:cNvSpPr/>
           <p:nvPr/>
         </p:nvSpPr>
@@ -7890,7 +7890,7 @@
       </p:sp>
       <p:sp>
         <p:nvSpPr>
-          <p:cNvPr id="128" name="Google Shape;128;p22"/>
+          <p:cNvPr id="130" name="Google Shape;130;p22"/>
           <p:cNvSpPr/>
           <p:nvPr/>
         </p:nvSpPr>
@@ -7940,7 +7940,7 @@
       </p:sp>
       <p:sp>
         <p:nvSpPr>
-          <p:cNvPr id="129" name="Google Shape;129;p22"/>
+          <p:cNvPr id="131" name="Google Shape;131;p22"/>
           <p:cNvSpPr/>
           <p:nvPr/>
         </p:nvSpPr>
@@ -7990,9 +7990,9 @@
       </p:sp>
       <p:cxnSp>
         <p:nvCxnSpPr>
-          <p:cNvPr id="130" name="Google Shape;130;p22"/>
+          <p:cNvPr id="132" name="Google Shape;132;p22"/>
           <p:cNvCxnSpPr>
-            <a:endCxn id="126" idx="2"/>
+            <a:endCxn id="128" idx="2"/>
           </p:cNvCxnSpPr>
           <p:nvPr/>
         </p:nvCxnSpPr>
@@ -8018,10 +8018,10 @@
       </p:cxnSp>
       <p:cxnSp>
         <p:nvCxnSpPr>
-          <p:cNvPr id="131" name="Google Shape;131;p22"/>
+          <p:cNvPr id="133" name="Google Shape;133;p22"/>
           <p:cNvCxnSpPr>
-            <a:stCxn id="126" idx="6"/>
-            <a:endCxn id="127" idx="2"/>
+            <a:stCxn id="128" idx="6"/>
+            <a:endCxn id="129" idx="2"/>
           </p:cNvCxnSpPr>
           <p:nvPr/>
         </p:nvCxnSpPr>
@@ -8047,10 +8047,10 @@
       </p:cxnSp>
       <p:cxnSp>
         <p:nvCxnSpPr>
-          <p:cNvPr id="132" name="Google Shape;132;p22"/>
+          <p:cNvPr id="134" name="Google Shape;134;p22"/>
           <p:cNvCxnSpPr>
-            <a:stCxn id="127" idx="7"/>
-            <a:endCxn id="128" idx="1"/>
+            <a:stCxn id="129" idx="7"/>
+            <a:endCxn id="130" idx="1"/>
           </p:cNvCxnSpPr>
           <p:nvPr/>
         </p:nvCxnSpPr>
@@ -8078,10 +8078,10 @@
       </p:cxnSp>
       <p:cxnSp>
         <p:nvCxnSpPr>
-          <p:cNvPr id="133" name="Google Shape;133;p22"/>
+          <p:cNvPr id="135" name="Google Shape;135;p22"/>
           <p:cNvCxnSpPr>
-            <a:stCxn id="128" idx="3"/>
-            <a:endCxn id="127" idx="5"/>
+            <a:stCxn id="130" idx="3"/>
+            <a:endCxn id="129" idx="5"/>
           </p:cNvCxnSpPr>
           <p:nvPr/>
         </p:nvCxnSpPr>
@@ -8109,10 +8109,10 @@
       </p:cxnSp>
       <p:cxnSp>
         <p:nvCxnSpPr>
-          <p:cNvPr id="134" name="Google Shape;134;p22"/>
+          <p:cNvPr id="136" name="Google Shape;136;p22"/>
           <p:cNvCxnSpPr>
-            <a:stCxn id="128" idx="4"/>
-            <a:endCxn id="129" idx="6"/>
+            <a:stCxn id="130" idx="4"/>
+            <a:endCxn id="131" idx="6"/>
           </p:cNvCxnSpPr>
           <p:nvPr/>
         </p:nvCxnSpPr>
@@ -8138,10 +8138,10 @@
       </p:cxnSp>
       <p:cxnSp>
         <p:nvCxnSpPr>
-          <p:cNvPr id="135" name="Google Shape;135;p22"/>
+          <p:cNvPr id="137" name="Google Shape;137;p22"/>
           <p:cNvCxnSpPr>
-            <a:stCxn id="129" idx="2"/>
-            <a:endCxn id="127" idx="4"/>
+            <a:stCxn id="131" idx="2"/>
+            <a:endCxn id="129" idx="4"/>
           </p:cNvCxnSpPr>
           <p:nvPr/>
         </p:nvCxnSpPr>
@@ -8167,10 +8167,10 @@
       </p:cxnSp>
       <p:cxnSp>
         <p:nvCxnSpPr>
-          <p:cNvPr id="136" name="Google Shape;136;p22"/>
+          <p:cNvPr id="138" name="Google Shape;138;p22"/>
           <p:cNvCxnSpPr>
-            <a:stCxn id="128" idx="6"/>
-            <a:endCxn id="124" idx="2"/>
+            <a:stCxn id="130" idx="6"/>
+            <a:endCxn id="126" idx="2"/>
           </p:cNvCxnSpPr>
           <p:nvPr/>
         </p:nvCxnSpPr>
@@ -8196,7 +8196,7 @@
       </p:cxnSp>
       <p:sp>
         <p:nvSpPr>
-          <p:cNvPr id="137" name="Google Shape;137;p22"/>
+          <p:cNvPr id="139" name="Google Shape;139;p22"/>
           <p:cNvSpPr txBox="1"/>
           <p:nvPr/>
         </p:nvSpPr>
@@ -8231,90 +8231,6 @@
             <a:r>
               <a:rPr lang="en"/>
               <a:t>a</a:t>
-            </a:r>
-            <a:endParaRPr/>
-          </a:p>
-        </p:txBody>
-      </p:sp>
-      <p:sp>
-        <p:nvSpPr>
-          <p:cNvPr id="138" name="Google Shape;138;p22"/>
-          <p:cNvSpPr txBox="1"/>
-          <p:nvPr/>
-        </p:nvSpPr>
-        <p:spPr>
-          <a:xfrm>
-            <a:off x="6151525" y="2171550"/>
-            <a:ext cx="340800" cy="400200"/>
-          </a:xfrm>
-          <a:prstGeom prst="rect">
-            <a:avLst/>
-          </a:prstGeom>
-          <a:noFill/>
-          <a:ln>
-            <a:noFill/>
-          </a:ln>
-        </p:spPr>
-        <p:txBody>
-          <a:bodyPr anchorCtr="0" anchor="t" bIns="91425" lIns="91425" spcFirstLastPara="1" rIns="91425" wrap="square" tIns="91425">
-            <a:spAutoFit/>
-          </a:bodyPr>
-          <a:lstStyle/>
-          <a:p>
-            <a:pPr indent="0" lvl="0" marL="0" rtl="0" algn="l">
-              <a:spcBef>
-                <a:spcPts val="0"/>
-              </a:spcBef>
-              <a:spcAft>
-                <a:spcPts val="0"/>
-              </a:spcAft>
-              <a:buNone/>
-            </a:pPr>
-            <a:r>
-              <a:rPr lang="en"/>
-              <a:t>d</a:t>
-            </a:r>
-            <a:endParaRPr/>
-          </a:p>
-        </p:txBody>
-      </p:sp>
-      <p:sp>
-        <p:nvSpPr>
-          <p:cNvPr id="139" name="Google Shape;139;p22"/>
-          <p:cNvSpPr txBox="1"/>
-          <p:nvPr/>
-        </p:nvSpPr>
-        <p:spPr>
-          <a:xfrm>
-            <a:off x="6220825" y="3223375"/>
-            <a:ext cx="340800" cy="400200"/>
-          </a:xfrm>
-          <a:prstGeom prst="rect">
-            <a:avLst/>
-          </a:prstGeom>
-          <a:noFill/>
-          <a:ln>
-            <a:noFill/>
-          </a:ln>
-        </p:spPr>
-        <p:txBody>
-          <a:bodyPr anchorCtr="0" anchor="t" bIns="91425" lIns="91425" spcFirstLastPara="1" rIns="91425" wrap="square" tIns="91425">
-            <a:spAutoFit/>
-          </a:bodyPr>
-          <a:lstStyle/>
-          <a:p>
-            <a:pPr indent="0" lvl="0" marL="0" rtl="0" algn="l">
-              <a:spcBef>
-                <a:spcPts val="0"/>
-              </a:spcBef>
-              <a:spcAft>
-                <a:spcPts val="0"/>
-              </a:spcAft>
-              <a:buNone/>
-            </a:pPr>
-            <a:r>
-              <a:rPr lang="en"/>
-              <a:t>i</a:t>
             </a:r>
             <a:endParaRPr/>
           </a:p>
@@ -8328,7 +8244,7 @@
         </p:nvSpPr>
         <p:spPr>
           <a:xfrm>
-            <a:off x="7766438" y="2711850"/>
+            <a:off x="6151525" y="2171550"/>
             <a:ext cx="340800" cy="400200"/>
           </a:xfrm>
           <a:prstGeom prst="rect">
@@ -8356,7 +8272,7 @@
             </a:pPr>
             <a:r>
               <a:rPr lang="en"/>
-              <a:t>e</a:t>
+              <a:t>d</a:t>
             </a:r>
             <a:endParaRPr/>
           </a:p>
@@ -8370,7 +8286,7 @@
         </p:nvSpPr>
         <p:spPr>
           <a:xfrm>
-            <a:off x="7179313" y="3750525"/>
+            <a:off x="6220825" y="3223375"/>
             <a:ext cx="340800" cy="400200"/>
           </a:xfrm>
           <a:prstGeom prst="rect">
@@ -8398,7 +8314,7 @@
             </a:pPr>
             <a:r>
               <a:rPr lang="en"/>
-              <a:t>t</a:t>
+              <a:t>i</a:t>
             </a:r>
             <a:endParaRPr/>
           </a:p>
@@ -8412,7 +8328,7 @@
         </p:nvSpPr>
         <p:spPr>
           <a:xfrm>
-            <a:off x="5305825" y="3826725"/>
+            <a:off x="7766438" y="2711850"/>
             <a:ext cx="340800" cy="400200"/>
           </a:xfrm>
           <a:prstGeom prst="rect">
@@ -8440,7 +8356,7 @@
             </a:pPr>
             <a:r>
               <a:rPr lang="en"/>
-              <a:t>r</a:t>
+              <a:t>e</a:t>
             </a:r>
             <a:endParaRPr/>
           </a:p>
@@ -8454,8 +8370,8 @@
         </p:nvSpPr>
         <p:spPr>
           <a:xfrm>
-            <a:off x="4709200" y="4645150"/>
-            <a:ext cx="4109100" cy="400200"/>
+            <a:off x="7179313" y="3750525"/>
+            <a:ext cx="340800" cy="400200"/>
           </a:xfrm>
           <a:prstGeom prst="rect">
             <a:avLst/>
@@ -8482,7 +8398,7 @@
             </a:pPr>
             <a:r>
               <a:rPr lang="en"/>
-              <a:t>FA for the Process Status Diagram</a:t>
+              <a:t>t</a:t>
             </a:r>
             <a:endParaRPr/>
           </a:p>
@@ -8496,8 +8412,8 @@
         </p:nvSpPr>
         <p:spPr>
           <a:xfrm>
-            <a:off x="540300" y="3131850"/>
-            <a:ext cx="1250400" cy="400200"/>
+            <a:off x="5305825" y="3826725"/>
+            <a:ext cx="340800" cy="400200"/>
           </a:xfrm>
           <a:prstGeom prst="rect">
             <a:avLst/>
@@ -8524,7 +8440,7 @@
             </a:pPr>
             <a:r>
               <a:rPr lang="en"/>
-              <a:t>input string:</a:t>
+              <a:t>r</a:t>
             </a:r>
             <a:endParaRPr/>
           </a:p>
@@ -8533,6 +8449,90 @@
       <p:sp>
         <p:nvSpPr>
           <p:cNvPr id="145" name="Google Shape;145;p22"/>
+          <p:cNvSpPr txBox="1"/>
+          <p:nvPr/>
+        </p:nvSpPr>
+        <p:spPr>
+          <a:xfrm>
+            <a:off x="4709200" y="4645150"/>
+            <a:ext cx="4109100" cy="400200"/>
+          </a:xfrm>
+          <a:prstGeom prst="rect">
+            <a:avLst/>
+          </a:prstGeom>
+          <a:noFill/>
+          <a:ln>
+            <a:noFill/>
+          </a:ln>
+        </p:spPr>
+        <p:txBody>
+          <a:bodyPr anchorCtr="0" anchor="t" bIns="91425" lIns="91425" spcFirstLastPara="1" rIns="91425" wrap="square" tIns="91425">
+            <a:spAutoFit/>
+          </a:bodyPr>
+          <a:lstStyle/>
+          <a:p>
+            <a:pPr indent="0" lvl="0" marL="0" rtl="0" algn="l">
+              <a:spcBef>
+                <a:spcPts val="0"/>
+              </a:spcBef>
+              <a:spcAft>
+                <a:spcPts val="0"/>
+              </a:spcAft>
+              <a:buNone/>
+            </a:pPr>
+            <a:r>
+              <a:rPr lang="en"/>
+              <a:t>FA for the Process Status Diagram</a:t>
+            </a:r>
+            <a:endParaRPr/>
+          </a:p>
+        </p:txBody>
+      </p:sp>
+      <p:sp>
+        <p:nvSpPr>
+          <p:cNvPr id="146" name="Google Shape;146;p22"/>
+          <p:cNvSpPr txBox="1"/>
+          <p:nvPr/>
+        </p:nvSpPr>
+        <p:spPr>
+          <a:xfrm>
+            <a:off x="540300" y="3131850"/>
+            <a:ext cx="1250400" cy="400200"/>
+          </a:xfrm>
+          <a:prstGeom prst="rect">
+            <a:avLst/>
+          </a:prstGeom>
+          <a:noFill/>
+          <a:ln>
+            <a:noFill/>
+          </a:ln>
+        </p:spPr>
+        <p:txBody>
+          <a:bodyPr anchorCtr="0" anchor="t" bIns="91425" lIns="91425" spcFirstLastPara="1" rIns="91425" wrap="square" tIns="91425">
+            <a:spAutoFit/>
+          </a:bodyPr>
+          <a:lstStyle/>
+          <a:p>
+            <a:pPr indent="0" lvl="0" marL="0" rtl="0" algn="l">
+              <a:spcBef>
+                <a:spcPts val="0"/>
+              </a:spcBef>
+              <a:spcAft>
+                <a:spcPts val="0"/>
+              </a:spcAft>
+              <a:buNone/>
+            </a:pPr>
+            <a:r>
+              <a:rPr lang="en"/>
+              <a:t>input string:</a:t>
+            </a:r>
+            <a:endParaRPr/>
+          </a:p>
+        </p:txBody>
+      </p:sp>
+      <p:sp>
+        <p:nvSpPr>
+          <p:cNvPr id="147" name="Google Shape;147;p22"/>
           <p:cNvSpPr/>
           <p:nvPr/>
         </p:nvSpPr>
@@ -8582,7 +8582,7 @@
       </p:sp>
       <p:sp>
         <p:nvSpPr>
-          <p:cNvPr id="146" name="Google Shape;146;p22"/>
+          <p:cNvPr id="148" name="Google Shape;148;p22"/>
           <p:cNvSpPr/>
           <p:nvPr/>
         </p:nvSpPr>
@@ -8632,7 +8632,7 @@
       </p:sp>
       <p:sp>
         <p:nvSpPr>
-          <p:cNvPr id="147" name="Google Shape;147;p22"/>
+          <p:cNvPr id="149" name="Google Shape;149;p22"/>
           <p:cNvSpPr/>
           <p:nvPr/>
         </p:nvSpPr>
@@ -8682,7 +8682,7 @@
       </p:sp>
       <p:sp>
         <p:nvSpPr>
-          <p:cNvPr id="148" name="Google Shape;148;p22"/>
+          <p:cNvPr id="150" name="Google Shape;150;p22"/>
           <p:cNvSpPr/>
           <p:nvPr/>
         </p:nvSpPr>
@@ -8732,7 +8732,7 @@
       </p:sp>
       <p:sp>
         <p:nvSpPr>
-          <p:cNvPr id="149" name="Google Shape;149;p22"/>
+          <p:cNvPr id="151" name="Google Shape;151;p22"/>
           <p:cNvSpPr/>
           <p:nvPr/>
         </p:nvSpPr>
@@ -8782,7 +8782,7 @@
       </p:sp>
       <p:sp>
         <p:nvSpPr>
-          <p:cNvPr id="150" name="Google Shape;150;p22"/>
+          <p:cNvPr id="152" name="Google Shape;152;p22"/>
           <p:cNvSpPr/>
           <p:nvPr/>
         </p:nvSpPr>
@@ -8832,7 +8832,7 @@
       </p:sp>
       <p:sp>
         <p:nvSpPr>
-          <p:cNvPr id="151" name="Google Shape;151;p22"/>
+          <p:cNvPr id="153" name="Google Shape;153;p22"/>
           <p:cNvSpPr/>
           <p:nvPr/>
         </p:nvSpPr>
@@ -8882,7 +8882,7 @@
       </p:sp>
       <p:sp>
         <p:nvSpPr>
-          <p:cNvPr id="152" name="Google Shape;152;p22"/>
+          <p:cNvPr id="154" name="Google Shape;154;p22"/>
           <p:cNvSpPr/>
           <p:nvPr/>
         </p:nvSpPr>
@@ -8932,13 +8932,13 @@
       </p:sp>
       <p:cxnSp>
         <p:nvCxnSpPr>
-          <p:cNvPr id="153" name="Google Shape;153;p22"/>
+          <p:cNvPr id="155" name="Google Shape;155;p22"/>
           <p:cNvCxnSpPr/>
           <p:nvPr/>
         </p:nvCxnSpPr>
         <p:spPr>
           <a:xfrm>
-            <a:off x="2773425" y="3794550"/>
+            <a:off x="1935225" y="3794550"/>
             <a:ext cx="8400" cy="257700"/>
           </a:xfrm>
           <a:prstGeom prst="straightConnector1">
@@ -8958,7 +8958,7 @@
       </p:cxnSp>
       <p:sp>
         <p:nvSpPr>
-          <p:cNvPr id="154" name="Google Shape;154;p22"/>
+          <p:cNvPr id="156" name="Google Shape;156;p22"/>
           <p:cNvSpPr/>
           <p:nvPr/>
         </p:nvSpPr>
@@ -9008,13 +9008,13 @@
       </p:sp>
       <p:sp>
         <p:nvSpPr>
-          <p:cNvPr id="155" name="Google Shape;155;p22"/>
+          <p:cNvPr id="157" name="Google Shape;157;p22"/>
           <p:cNvSpPr/>
           <p:nvPr/>
         </p:nvSpPr>
         <p:spPr>
           <a:xfrm>
-            <a:off x="2963938" y="2979163"/>
+            <a:off x="4097063" y="2979175"/>
             <a:ext cx="106800" cy="106800"/>
           </a:xfrm>
           <a:prstGeom prst="ellipse">
@@ -9068,7 +9068,7 @@
   <p:cSld>
     <p:spTree>
       <p:nvGrpSpPr>
-        <p:cNvPr id="159" name="Shape 159"/>
+        <p:cNvPr id="161" name="Shape 161"/>
         <p:cNvGrpSpPr/>
         <p:nvPr/>
       </p:nvGrpSpPr>
@@ -9082,7 +9082,7 @@
       </p:grpSpPr>
       <p:sp>
         <p:nvSpPr>
-          <p:cNvPr id="160" name="Google Shape;160;p23"/>
+          <p:cNvPr id="162" name="Google Shape;162;p23"/>
           <p:cNvSpPr txBox="1"/>
           <p:nvPr>
             <p:ph idx="1" type="body"/>
@@ -9090,7 +9090,7 @@
         </p:nvSpPr>
         <p:spPr>
           <a:xfrm>
-            <a:off x="311700" y="1127550"/>
+            <a:off x="311700" y="1203750"/>
             <a:ext cx="8520600" cy="3416400"/>
           </a:xfrm>
           <a:prstGeom prst="rect">
@@ -9221,7 +9221,7 @@
       </p:sp>
       <p:sp>
         <p:nvSpPr>
-          <p:cNvPr id="161" name="Google Shape;161;p23"/>
+          <p:cNvPr id="163" name="Google Shape;163;p23"/>
           <p:cNvSpPr/>
           <p:nvPr/>
         </p:nvSpPr>
@@ -9270,7 +9270,7 @@
       </p:sp>
       <p:sp>
         <p:nvSpPr>
-          <p:cNvPr id="162" name="Google Shape;162;p23"/>
+          <p:cNvPr id="164" name="Google Shape;164;p23"/>
           <p:cNvSpPr txBox="1"/>
           <p:nvPr>
             <p:ph type="title"/>
@@ -9310,7 +9310,7 @@
       </p:sp>
       <p:sp>
         <p:nvSpPr>
-          <p:cNvPr id="163" name="Google Shape;163;p23"/>
+          <p:cNvPr id="165" name="Google Shape;165;p23"/>
           <p:cNvSpPr txBox="1"/>
           <p:nvPr/>
         </p:nvSpPr>
@@ -9352,7 +9352,7 @@
       </p:sp>
       <p:sp>
         <p:nvSpPr>
-          <p:cNvPr id="164" name="Google Shape;164;p23"/>
+          <p:cNvPr id="166" name="Google Shape;166;p23"/>
           <p:cNvSpPr/>
           <p:nvPr/>
         </p:nvSpPr>
@@ -9401,7 +9401,7 @@
       </p:sp>
       <p:sp>
         <p:nvSpPr>
-          <p:cNvPr id="165" name="Google Shape;165;p23"/>
+          <p:cNvPr id="167" name="Google Shape;167;p23"/>
           <p:cNvSpPr/>
           <p:nvPr/>
         </p:nvSpPr>
@@ -9450,7 +9450,7 @@
       </p:sp>
       <p:sp>
         <p:nvSpPr>
-          <p:cNvPr id="166" name="Google Shape;166;p23"/>
+          <p:cNvPr id="168" name="Google Shape;168;p23"/>
           <p:cNvSpPr/>
           <p:nvPr/>
         </p:nvSpPr>
@@ -9499,7 +9499,7 @@
       </p:sp>
       <p:sp>
         <p:nvSpPr>
-          <p:cNvPr id="167" name="Google Shape;167;p23"/>
+          <p:cNvPr id="169" name="Google Shape;169;p23"/>
           <p:cNvSpPr/>
           <p:nvPr/>
         </p:nvSpPr>
@@ -9548,7 +9548,7 @@
       </p:sp>
       <p:sp>
         <p:nvSpPr>
-          <p:cNvPr id="168" name="Google Shape;168;p23"/>
+          <p:cNvPr id="170" name="Google Shape;170;p23"/>
           <p:cNvSpPr/>
           <p:nvPr/>
         </p:nvSpPr>
@@ -9597,7 +9597,7 @@
       </p:sp>
       <p:sp>
         <p:nvSpPr>
-          <p:cNvPr id="169" name="Google Shape;169;p23"/>
+          <p:cNvPr id="171" name="Google Shape;171;p23"/>
           <p:cNvSpPr/>
           <p:nvPr/>
         </p:nvSpPr>
@@ -9646,7 +9646,7 @@
       </p:sp>
       <p:sp>
         <p:nvSpPr>
-          <p:cNvPr id="170" name="Google Shape;170;p23"/>
+          <p:cNvPr id="172" name="Google Shape;172;p23"/>
           <p:cNvSpPr/>
           <p:nvPr/>
         </p:nvSpPr>
@@ -9695,7 +9695,7 @@
       </p:sp>
       <p:sp>
         <p:nvSpPr>
-          <p:cNvPr id="171" name="Google Shape;171;p23"/>
+          <p:cNvPr id="173" name="Google Shape;173;p23"/>
           <p:cNvSpPr/>
           <p:nvPr/>
         </p:nvSpPr>
@@ -9745,7 +9745,7 @@
       </p:sp>
       <p:cxnSp>
         <p:nvCxnSpPr>
-          <p:cNvPr id="172" name="Google Shape;172;p23"/>
+          <p:cNvPr id="174" name="Google Shape;174;p23"/>
           <p:cNvCxnSpPr/>
           <p:nvPr/>
         </p:nvCxnSpPr>
@@ -9771,7 +9771,7 @@
       </p:cxnSp>
       <p:cxnSp>
         <p:nvCxnSpPr>
-          <p:cNvPr id="173" name="Google Shape;173;p23"/>
+          <p:cNvPr id="175" name="Google Shape;175;p23"/>
           <p:cNvCxnSpPr/>
           <p:nvPr/>
         </p:nvCxnSpPr>
@@ -9797,7 +9797,7 @@
       </p:cxnSp>
       <p:sp>
         <p:nvSpPr>
-          <p:cNvPr id="174" name="Google Shape;174;p23"/>
+          <p:cNvPr id="176" name="Google Shape;176;p23"/>
           <p:cNvSpPr/>
           <p:nvPr/>
         </p:nvSpPr>
@@ -9846,7 +9846,7 @@
       </p:sp>
       <p:sp>
         <p:nvSpPr>
-          <p:cNvPr id="175" name="Google Shape;175;p23"/>
+          <p:cNvPr id="177" name="Google Shape;177;p23"/>
           <p:cNvSpPr/>
           <p:nvPr/>
         </p:nvSpPr>
@@ -9895,7 +9895,7 @@
       </p:sp>
       <p:sp>
         <p:nvSpPr>
-          <p:cNvPr id="176" name="Google Shape;176;p23"/>
+          <p:cNvPr id="178" name="Google Shape;178;p23"/>
           <p:cNvSpPr/>
           <p:nvPr/>
         </p:nvSpPr>
@@ -9944,7 +9944,7 @@
       </p:sp>
       <p:sp>
         <p:nvSpPr>
-          <p:cNvPr id="177" name="Google Shape;177;p23"/>
+          <p:cNvPr id="179" name="Google Shape;179;p23"/>
           <p:cNvSpPr/>
           <p:nvPr/>
         </p:nvSpPr>
@@ -9993,7 +9993,7 @@
       </p:sp>
       <p:sp>
         <p:nvSpPr>
-          <p:cNvPr id="178" name="Google Shape;178;p23"/>
+          <p:cNvPr id="180" name="Google Shape;180;p23"/>
           <p:cNvSpPr/>
           <p:nvPr/>
         </p:nvSpPr>
@@ -10042,7 +10042,7 @@
       </p:sp>
       <p:sp>
         <p:nvSpPr>
-          <p:cNvPr id="179" name="Google Shape;179;p23"/>
+          <p:cNvPr id="181" name="Google Shape;181;p23"/>
           <p:cNvSpPr txBox="1"/>
           <p:nvPr/>
         </p:nvSpPr>
@@ -10084,7 +10084,7 @@
       </p:sp>
       <p:sp>
         <p:nvSpPr>
-          <p:cNvPr id="180" name="Google Shape;180;p23"/>
+          <p:cNvPr id="182" name="Google Shape;182;p23"/>
           <p:cNvSpPr txBox="1"/>
           <p:nvPr/>
         </p:nvSpPr>
@@ -10148,7 +10148,7 @@
       </p:sp>
       <p:cxnSp>
         <p:nvCxnSpPr>
-          <p:cNvPr id="181" name="Google Shape;181;p23"/>
+          <p:cNvPr id="183" name="Google Shape;183;p23"/>
           <p:cNvCxnSpPr/>
           <p:nvPr/>
         </p:nvCxnSpPr>
@@ -10176,7 +10176,7 @@
       </p:cxnSp>
       <p:sp>
         <p:nvSpPr>
-          <p:cNvPr id="182" name="Google Shape;182;p23"/>
+          <p:cNvPr id="184" name="Google Shape;184;p23"/>
           <p:cNvSpPr/>
           <p:nvPr/>
         </p:nvSpPr>
@@ -10228,7 +10228,7 @@
       </p:sp>
       <p:grpSp>
         <p:nvGrpSpPr>
-          <p:cNvPr id="183" name="Google Shape;183;p23"/>
+          <p:cNvPr id="185" name="Google Shape;185;p23"/>
           <p:cNvGrpSpPr/>
           <p:nvPr/>
         </p:nvGrpSpPr>
@@ -10242,7 +10242,7 @@
         </p:grpSpPr>
         <p:sp>
           <p:nvSpPr>
-            <p:cNvPr id="184" name="Google Shape;184;p23"/>
+            <p:cNvPr id="186" name="Google Shape;186;p23"/>
             <p:cNvSpPr/>
             <p:nvPr/>
           </p:nvSpPr>
@@ -10291,7 +10291,7 @@
         </p:sp>
         <p:grpSp>
           <p:nvGrpSpPr>
-            <p:cNvPr id="185" name="Google Shape;185;p23"/>
+            <p:cNvPr id="187" name="Google Shape;187;p23"/>
             <p:cNvGrpSpPr/>
             <p:nvPr/>
           </p:nvGrpSpPr>
@@ -10305,7 +10305,7 @@
           </p:grpSpPr>
           <p:sp>
             <p:nvSpPr>
-              <p:cNvPr id="186" name="Google Shape;186;p23"/>
+              <p:cNvPr id="188" name="Google Shape;188;p23"/>
               <p:cNvSpPr/>
               <p:nvPr/>
             </p:nvSpPr>
@@ -10354,7 +10354,7 @@
           </p:sp>
           <p:sp>
             <p:nvSpPr>
-              <p:cNvPr id="187" name="Google Shape;187;p23"/>
+              <p:cNvPr id="189" name="Google Shape;189;p23"/>
               <p:cNvSpPr/>
               <p:nvPr/>
             </p:nvSpPr>
@@ -10403,7 +10403,7 @@
           </p:sp>
           <p:sp>
             <p:nvSpPr>
-              <p:cNvPr id="188" name="Google Shape;188;p23"/>
+              <p:cNvPr id="190" name="Google Shape;190;p23"/>
               <p:cNvSpPr/>
               <p:nvPr/>
             </p:nvSpPr>
@@ -10452,7 +10452,7 @@
           </p:sp>
           <p:sp>
             <p:nvSpPr>
-              <p:cNvPr id="189" name="Google Shape;189;p23"/>
+              <p:cNvPr id="191" name="Google Shape;191;p23"/>
               <p:cNvSpPr/>
               <p:nvPr/>
             </p:nvSpPr>
@@ -10501,7 +10501,7 @@
           </p:sp>
           <p:sp>
             <p:nvSpPr>
-              <p:cNvPr id="190" name="Google Shape;190;p23"/>
+              <p:cNvPr id="192" name="Google Shape;192;p23"/>
               <p:cNvSpPr/>
               <p:nvPr/>
             </p:nvSpPr>
@@ -10550,7 +10550,7 @@
           </p:sp>
           <p:sp>
             <p:nvSpPr>
-              <p:cNvPr id="191" name="Google Shape;191;p23"/>
+              <p:cNvPr id="193" name="Google Shape;193;p23"/>
               <p:cNvSpPr/>
               <p:nvPr/>
             </p:nvSpPr>
@@ -10599,9 +10599,9 @@
           </p:sp>
           <p:cxnSp>
             <p:nvCxnSpPr>
-              <p:cNvPr id="192" name="Google Shape;192;p23"/>
+              <p:cNvPr id="194" name="Google Shape;194;p23"/>
               <p:cNvCxnSpPr>
-                <a:endCxn id="188" idx="2"/>
+                <a:endCxn id="190" idx="2"/>
               </p:cNvCxnSpPr>
               <p:nvPr/>
             </p:nvCxnSpPr>
@@ -10627,10 +10627,10 @@
           </p:cxnSp>
           <p:cxnSp>
             <p:nvCxnSpPr>
-              <p:cNvPr id="193" name="Google Shape;193;p23"/>
+              <p:cNvPr id="195" name="Google Shape;195;p23"/>
               <p:cNvCxnSpPr>
-                <a:stCxn id="188" idx="6"/>
-                <a:endCxn id="189" idx="2"/>
+                <a:stCxn id="190" idx="6"/>
+                <a:endCxn id="191" idx="2"/>
               </p:cNvCxnSpPr>
               <p:nvPr/>
             </p:nvCxnSpPr>
@@ -10656,10 +10656,10 @@
           </p:cxnSp>
           <p:cxnSp>
             <p:nvCxnSpPr>
-              <p:cNvPr id="194" name="Google Shape;194;p23"/>
+              <p:cNvPr id="196" name="Google Shape;196;p23"/>
               <p:cNvCxnSpPr>
-                <a:stCxn id="189" idx="7"/>
-                <a:endCxn id="190" idx="1"/>
+                <a:stCxn id="191" idx="7"/>
+                <a:endCxn id="192" idx="1"/>
               </p:cNvCxnSpPr>
               <p:nvPr/>
             </p:nvCxnSpPr>
@@ -10687,10 +10687,10 @@
           </p:cxnSp>
           <p:cxnSp>
             <p:nvCxnSpPr>
-              <p:cNvPr id="195" name="Google Shape;195;p23"/>
+              <p:cNvPr id="197" name="Google Shape;197;p23"/>
               <p:cNvCxnSpPr>
-                <a:stCxn id="190" idx="3"/>
-                <a:endCxn id="189" idx="5"/>
+                <a:stCxn id="192" idx="3"/>
+                <a:endCxn id="191" idx="5"/>
               </p:cNvCxnSpPr>
               <p:nvPr/>
             </p:nvCxnSpPr>
@@ -10718,10 +10718,10 @@
           </p:cxnSp>
           <p:cxnSp>
             <p:nvCxnSpPr>
-              <p:cNvPr id="196" name="Google Shape;196;p23"/>
+              <p:cNvPr id="198" name="Google Shape;198;p23"/>
               <p:cNvCxnSpPr>
-                <a:stCxn id="190" idx="4"/>
-                <a:endCxn id="191" idx="6"/>
+                <a:stCxn id="192" idx="4"/>
+                <a:endCxn id="193" idx="6"/>
               </p:cNvCxnSpPr>
               <p:nvPr/>
             </p:nvCxnSpPr>
@@ -10747,10 +10747,10 @@
           </p:cxnSp>
           <p:cxnSp>
             <p:nvCxnSpPr>
-              <p:cNvPr id="197" name="Google Shape;197;p23"/>
+              <p:cNvPr id="199" name="Google Shape;199;p23"/>
               <p:cNvCxnSpPr>
-                <a:stCxn id="191" idx="2"/>
-                <a:endCxn id="189" idx="4"/>
+                <a:stCxn id="193" idx="2"/>
+                <a:endCxn id="191" idx="4"/>
               </p:cNvCxnSpPr>
               <p:nvPr/>
             </p:nvCxnSpPr>
@@ -10776,10 +10776,10 @@
           </p:cxnSp>
           <p:cxnSp>
             <p:nvCxnSpPr>
-              <p:cNvPr id="198" name="Google Shape;198;p23"/>
+              <p:cNvPr id="200" name="Google Shape;200;p23"/>
               <p:cNvCxnSpPr>
-                <a:stCxn id="190" idx="6"/>
-                <a:endCxn id="186" idx="2"/>
+                <a:stCxn id="192" idx="6"/>
+                <a:endCxn id="188" idx="2"/>
               </p:cNvCxnSpPr>
               <p:nvPr/>
             </p:nvCxnSpPr>
@@ -10807,7 +10807,7 @@
       </p:grpSp>
       <p:sp>
         <p:nvSpPr>
-          <p:cNvPr id="199" name="Google Shape;199;p23"/>
+          <p:cNvPr id="201" name="Google Shape;201;p23"/>
           <p:cNvSpPr txBox="1"/>
           <p:nvPr/>
         </p:nvSpPr>
@@ -10849,7 +10849,7 @@
       </p:sp>
       <p:sp>
         <p:nvSpPr>
-          <p:cNvPr id="200" name="Google Shape;200;p23"/>
+          <p:cNvPr id="202" name="Google Shape;202;p23"/>
           <p:cNvSpPr txBox="1"/>
           <p:nvPr/>
         </p:nvSpPr>
@@ -10904,7 +10904,7 @@
   <p:cSld>
     <p:spTree>
       <p:nvGrpSpPr>
-        <p:cNvPr id="204" name="Shape 204"/>
+        <p:cNvPr id="206" name="Shape 206"/>
         <p:cNvGrpSpPr/>
         <p:nvPr/>
       </p:nvGrpSpPr>
@@ -10918,7 +10918,7 @@
       </p:grpSpPr>
       <p:sp>
         <p:nvSpPr>
-          <p:cNvPr id="205" name="Google Shape;205;p24"/>
+          <p:cNvPr id="207" name="Google Shape;207;p24"/>
           <p:cNvSpPr txBox="1"/>
           <p:nvPr>
             <p:ph idx="1" type="body"/>
@@ -11072,7 +11072,7 @@
       </p:sp>
       <p:sp>
         <p:nvSpPr>
-          <p:cNvPr id="206" name="Google Shape;206;p24"/>
+          <p:cNvPr id="208" name="Google Shape;208;p24"/>
           <p:cNvSpPr/>
           <p:nvPr/>
         </p:nvSpPr>
@@ -11121,7 +11121,7 @@
       </p:sp>
       <p:sp>
         <p:nvSpPr>
-          <p:cNvPr id="207" name="Google Shape;207;p24"/>
+          <p:cNvPr id="209" name="Google Shape;209;p24"/>
           <p:cNvSpPr txBox="1"/>
           <p:nvPr>
             <p:ph type="title"/>
@@ -11161,7 +11161,7 @@
       </p:sp>
       <p:grpSp>
         <p:nvGrpSpPr>
-          <p:cNvPr id="208" name="Google Shape;208;p24"/>
+          <p:cNvPr id="210" name="Google Shape;210;p24"/>
           <p:cNvGrpSpPr/>
           <p:nvPr/>
         </p:nvGrpSpPr>
@@ -11175,7 +11175,7 @@
         </p:grpSpPr>
         <p:sp>
           <p:nvSpPr>
-            <p:cNvPr id="209" name="Google Shape;209;p24"/>
+            <p:cNvPr id="211" name="Google Shape;211;p24"/>
             <p:cNvSpPr/>
             <p:nvPr/>
           </p:nvSpPr>
@@ -11224,7 +11224,7 @@
         </p:sp>
         <p:grpSp>
           <p:nvGrpSpPr>
-            <p:cNvPr id="210" name="Google Shape;210;p24"/>
+            <p:cNvPr id="212" name="Google Shape;212;p24"/>
             <p:cNvGrpSpPr/>
             <p:nvPr/>
           </p:nvGrpSpPr>
@@ -11238,7 +11238,7 @@
           </p:grpSpPr>
           <p:sp>
             <p:nvSpPr>
-              <p:cNvPr id="211" name="Google Shape;211;p24"/>
+              <p:cNvPr id="213" name="Google Shape;213;p24"/>
               <p:cNvSpPr/>
               <p:nvPr/>
             </p:nvSpPr>
@@ -11287,7 +11287,7 @@
           </p:sp>
           <p:sp>
             <p:nvSpPr>
-              <p:cNvPr id="212" name="Google Shape;212;p24"/>
+              <p:cNvPr id="214" name="Google Shape;214;p24"/>
               <p:cNvSpPr/>
               <p:nvPr/>
             </p:nvSpPr>
@@ -11336,7 +11336,7 @@
           </p:sp>
           <p:sp>
             <p:nvSpPr>
-              <p:cNvPr id="213" name="Google Shape;213;p24"/>
+              <p:cNvPr id="215" name="Google Shape;215;p24"/>
               <p:cNvSpPr/>
               <p:nvPr/>
             </p:nvSpPr>
@@ -11385,7 +11385,7 @@
           </p:sp>
           <p:sp>
             <p:nvSpPr>
-              <p:cNvPr id="214" name="Google Shape;214;p24"/>
+              <p:cNvPr id="216" name="Google Shape;216;p24"/>
               <p:cNvSpPr/>
               <p:nvPr/>
             </p:nvSpPr>
@@ -11434,7 +11434,7 @@
           </p:sp>
           <p:sp>
             <p:nvSpPr>
-              <p:cNvPr id="215" name="Google Shape;215;p24"/>
+              <p:cNvPr id="217" name="Google Shape;217;p24"/>
               <p:cNvSpPr/>
               <p:nvPr/>
             </p:nvSpPr>
@@ -11483,7 +11483,7 @@
           </p:sp>
           <p:sp>
             <p:nvSpPr>
-              <p:cNvPr id="216" name="Google Shape;216;p24"/>
+              <p:cNvPr id="218" name="Google Shape;218;p24"/>
               <p:cNvSpPr/>
               <p:nvPr/>
             </p:nvSpPr>
@@ -11532,9 +11532,9 @@
           </p:sp>
           <p:cxnSp>
             <p:nvCxnSpPr>
-              <p:cNvPr id="217" name="Google Shape;217;p24"/>
+              <p:cNvPr id="219" name="Google Shape;219;p24"/>
               <p:cNvCxnSpPr>
-                <a:endCxn id="213" idx="2"/>
+                <a:endCxn id="215" idx="2"/>
               </p:cNvCxnSpPr>
               <p:nvPr/>
             </p:nvCxnSpPr>
@@ -11560,10 +11560,10 @@
           </p:cxnSp>
           <p:cxnSp>
             <p:nvCxnSpPr>
-              <p:cNvPr id="218" name="Google Shape;218;p24"/>
+              <p:cNvPr id="220" name="Google Shape;220;p24"/>
               <p:cNvCxnSpPr>
-                <a:stCxn id="213" idx="6"/>
-                <a:endCxn id="214" idx="2"/>
+                <a:stCxn id="215" idx="6"/>
+                <a:endCxn id="216" idx="2"/>
               </p:cNvCxnSpPr>
               <p:nvPr/>
             </p:nvCxnSpPr>
@@ -11589,10 +11589,10 @@
           </p:cxnSp>
           <p:cxnSp>
             <p:nvCxnSpPr>
-              <p:cNvPr id="219" name="Google Shape;219;p24"/>
+              <p:cNvPr id="221" name="Google Shape;221;p24"/>
               <p:cNvCxnSpPr>
-                <a:stCxn id="214" idx="7"/>
-                <a:endCxn id="215" idx="1"/>
+                <a:stCxn id="216" idx="7"/>
+                <a:endCxn id="217" idx="1"/>
               </p:cNvCxnSpPr>
               <p:nvPr/>
             </p:nvCxnSpPr>
@@ -11620,10 +11620,10 @@
           </p:cxnSp>
           <p:cxnSp>
             <p:nvCxnSpPr>
-              <p:cNvPr id="220" name="Google Shape;220;p24"/>
+              <p:cNvPr id="222" name="Google Shape;222;p24"/>
               <p:cNvCxnSpPr>
-                <a:stCxn id="215" idx="3"/>
-                <a:endCxn id="214" idx="5"/>
+                <a:stCxn id="217" idx="3"/>
+                <a:endCxn id="216" idx="5"/>
               </p:cNvCxnSpPr>
               <p:nvPr/>
             </p:nvCxnSpPr>
@@ -11651,10 +11651,10 @@
           </p:cxnSp>
           <p:cxnSp>
             <p:nvCxnSpPr>
-              <p:cNvPr id="221" name="Google Shape;221;p24"/>
+              <p:cNvPr id="223" name="Google Shape;223;p24"/>
               <p:cNvCxnSpPr>
-                <a:stCxn id="215" idx="4"/>
-                <a:endCxn id="216" idx="6"/>
+                <a:stCxn id="217" idx="4"/>
+                <a:endCxn id="218" idx="6"/>
               </p:cNvCxnSpPr>
               <p:nvPr/>
             </p:nvCxnSpPr>
@@ -11680,10 +11680,10 @@
           </p:cxnSp>
           <p:cxnSp>
             <p:nvCxnSpPr>
-              <p:cNvPr id="222" name="Google Shape;222;p24"/>
+              <p:cNvPr id="224" name="Google Shape;224;p24"/>
               <p:cNvCxnSpPr>
-                <a:stCxn id="216" idx="2"/>
-                <a:endCxn id="214" idx="4"/>
+                <a:stCxn id="218" idx="2"/>
+                <a:endCxn id="216" idx="4"/>
               </p:cNvCxnSpPr>
               <p:nvPr/>
             </p:nvCxnSpPr>
@@ -11709,10 +11709,10 @@
           </p:cxnSp>
           <p:cxnSp>
             <p:nvCxnSpPr>
-              <p:cNvPr id="223" name="Google Shape;223;p24"/>
+              <p:cNvPr id="225" name="Google Shape;225;p24"/>
               <p:cNvCxnSpPr>
-                <a:stCxn id="215" idx="6"/>
-                <a:endCxn id="211" idx="2"/>
+                <a:stCxn id="217" idx="6"/>
+                <a:endCxn id="213" idx="2"/>
               </p:cNvCxnSpPr>
               <p:nvPr/>
             </p:nvCxnSpPr>
@@ -11740,7 +11740,7 @@
       </p:grpSp>
       <p:sp>
         <p:nvSpPr>
-          <p:cNvPr id="224" name="Google Shape;224;p24"/>
+          <p:cNvPr id="226" name="Google Shape;226;p24"/>
           <p:cNvSpPr/>
           <p:nvPr/>
         </p:nvSpPr>
@@ -11789,7 +11789,7 @@
       </p:sp>
       <p:sp>
         <p:nvSpPr>
-          <p:cNvPr id="225" name="Google Shape;225;p24"/>
+          <p:cNvPr id="227" name="Google Shape;227;p24"/>
           <p:cNvSpPr/>
           <p:nvPr/>
         </p:nvSpPr>
@@ -11838,7 +11838,7 @@
       </p:sp>
       <p:sp>
         <p:nvSpPr>
-          <p:cNvPr id="226" name="Google Shape;226;p24"/>
+          <p:cNvPr id="228" name="Google Shape;228;p24"/>
           <p:cNvSpPr/>
           <p:nvPr/>
         </p:nvSpPr>
@@ -11887,7 +11887,7 @@
       </p:sp>
       <p:sp>
         <p:nvSpPr>
-          <p:cNvPr id="227" name="Google Shape;227;p24"/>
+          <p:cNvPr id="229" name="Google Shape;229;p24"/>
           <p:cNvSpPr/>
           <p:nvPr/>
         </p:nvSpPr>
@@ -11936,7 +11936,7 @@
       </p:sp>
       <p:sp>
         <p:nvSpPr>
-          <p:cNvPr id="228" name="Google Shape;228;p24"/>
+          <p:cNvPr id="230" name="Google Shape;230;p24"/>
           <p:cNvSpPr/>
           <p:nvPr/>
         </p:nvSpPr>
@@ -11985,7 +11985,7 @@
       </p:sp>
       <p:sp>
         <p:nvSpPr>
-          <p:cNvPr id="229" name="Google Shape;229;p24"/>
+          <p:cNvPr id="231" name="Google Shape;231;p24"/>
           <p:cNvSpPr/>
           <p:nvPr/>
         </p:nvSpPr>
@@ -12037,7 +12037,7 @@
       </p:sp>
       <p:sp>
         <p:nvSpPr>
-          <p:cNvPr id="230" name="Google Shape;230;p24"/>
+          <p:cNvPr id="232" name="Google Shape;232;p24"/>
           <p:cNvSpPr/>
           <p:nvPr/>
         </p:nvSpPr>
@@ -12089,7 +12089,7 @@
       </p:sp>
       <p:sp>
         <p:nvSpPr>
-          <p:cNvPr id="231" name="Google Shape;231;p24"/>
+          <p:cNvPr id="233" name="Google Shape;233;p24"/>
           <p:cNvSpPr/>
           <p:nvPr/>
         </p:nvSpPr>
@@ -12138,7 +12138,7 @@
       </p:sp>
       <p:sp>
         <p:nvSpPr>
-          <p:cNvPr id="232" name="Google Shape;232;p24"/>
+          <p:cNvPr id="234" name="Google Shape;234;p24"/>
           <p:cNvSpPr/>
           <p:nvPr/>
         </p:nvSpPr>
@@ -12187,7 +12187,7 @@
       </p:sp>
       <p:sp>
         <p:nvSpPr>
-          <p:cNvPr id="233" name="Google Shape;233;p24"/>
+          <p:cNvPr id="235" name="Google Shape;235;p24"/>
           <p:cNvSpPr/>
           <p:nvPr/>
         </p:nvSpPr>
@@ -12246,7 +12246,7 @@
       </p:sp>
       <p:sp>
         <p:nvSpPr>
-          <p:cNvPr id="234" name="Google Shape;234;p24"/>
+          <p:cNvPr id="236" name="Google Shape;236;p24"/>
           <p:cNvSpPr/>
           <p:nvPr/>
         </p:nvSpPr>
@@ -12287,7 +12287,8 @@
               <a:buNone/>
             </a:pPr>
             <a:r>
-              <a:t/>
+              <a:rPr lang="en"/>
+              <a:t>a</a:t>
             </a:r>
             <a:endParaRPr/>
           </a:p>
@@ -12295,7 +12296,7 @@
       </p:sp>
       <p:sp>
         <p:nvSpPr>
-          <p:cNvPr id="235" name="Google Shape;235;p24"/>
+          <p:cNvPr id="237" name="Google Shape;237;p24"/>
           <p:cNvSpPr txBox="1"/>
           <p:nvPr/>
         </p:nvSpPr>
@@ -12337,7 +12338,7 @@
       </p:sp>
       <p:sp>
         <p:nvSpPr>
-          <p:cNvPr id="236" name="Google Shape;236;p24"/>
+          <p:cNvPr id="238" name="Google Shape;238;p24"/>
           <p:cNvSpPr/>
           <p:nvPr/>
         </p:nvSpPr>
@@ -12386,7 +12387,7 @@
       </p:sp>
       <p:sp>
         <p:nvSpPr>
-          <p:cNvPr id="237" name="Google Shape;237;p24"/>
+          <p:cNvPr id="239" name="Google Shape;239;p24"/>
           <p:cNvSpPr/>
           <p:nvPr/>
         </p:nvSpPr>
@@ -12435,7 +12436,7 @@
       </p:sp>
       <p:sp>
         <p:nvSpPr>
-          <p:cNvPr id="238" name="Google Shape;238;p24"/>
+          <p:cNvPr id="240" name="Google Shape;240;p24"/>
           <p:cNvSpPr/>
           <p:nvPr/>
         </p:nvSpPr>
@@ -12484,7 +12485,7 @@
       </p:sp>
       <p:sp>
         <p:nvSpPr>
-          <p:cNvPr id="239" name="Google Shape;239;p24"/>
+          <p:cNvPr id="241" name="Google Shape;241;p24"/>
           <p:cNvSpPr/>
           <p:nvPr/>
         </p:nvSpPr>
@@ -12533,7 +12534,7 @@
       </p:sp>
       <p:sp>
         <p:nvSpPr>
-          <p:cNvPr id="240" name="Google Shape;240;p24"/>
+          <p:cNvPr id="242" name="Google Shape;242;p24"/>
           <p:cNvSpPr/>
           <p:nvPr/>
         </p:nvSpPr>
@@ -12583,7 +12584,7 @@
       </p:sp>
       <p:sp>
         <p:nvSpPr>
-          <p:cNvPr id="241" name="Google Shape;241;p24"/>
+          <p:cNvPr id="243" name="Google Shape;243;p24"/>
           <p:cNvSpPr/>
           <p:nvPr/>
         </p:nvSpPr>
@@ -12633,7 +12634,7 @@
       </p:sp>
       <p:sp>
         <p:nvSpPr>
-          <p:cNvPr id="242" name="Google Shape;242;p24"/>
+          <p:cNvPr id="244" name="Google Shape;244;p24"/>
           <p:cNvSpPr/>
           <p:nvPr/>
         </p:nvSpPr>
@@ -12683,7 +12684,7 @@
       </p:sp>
       <p:sp>
         <p:nvSpPr>
-          <p:cNvPr id="243" name="Google Shape;243;p24"/>
+          <p:cNvPr id="245" name="Google Shape;245;p24"/>
           <p:cNvSpPr/>
           <p:nvPr/>
         </p:nvSpPr>
@@ -12733,7 +12734,7 @@
       </p:sp>
       <p:cxnSp>
         <p:nvCxnSpPr>
-          <p:cNvPr id="244" name="Google Shape;244;p24"/>
+          <p:cNvPr id="246" name="Google Shape;246;p24"/>
           <p:cNvCxnSpPr/>
           <p:nvPr/>
         </p:nvCxnSpPr>
@@ -12759,13 +12760,13 @@
       </p:cxnSp>
       <p:cxnSp>
         <p:nvCxnSpPr>
-          <p:cNvPr id="245" name="Google Shape;245;p24"/>
+          <p:cNvPr id="247" name="Google Shape;247;p24"/>
           <p:cNvCxnSpPr/>
           <p:nvPr/>
         </p:nvCxnSpPr>
         <p:spPr>
           <a:xfrm rot="10800000">
-            <a:off x="7644301" y="2951500"/>
+            <a:off x="7110901" y="2951500"/>
             <a:ext cx="900" cy="363600"/>
           </a:xfrm>
           <a:prstGeom prst="straightConnector1">
@@ -12785,7 +12786,7 @@
       </p:cxnSp>
       <p:sp>
         <p:nvSpPr>
-          <p:cNvPr id="246" name="Google Shape;246;p24"/>
+          <p:cNvPr id="248" name="Google Shape;248;p24"/>
           <p:cNvSpPr txBox="1"/>
           <p:nvPr/>
         </p:nvSpPr>
@@ -12827,7 +12828,7 @@
       </p:sp>
       <p:sp>
         <p:nvSpPr>
-          <p:cNvPr id="247" name="Google Shape;247;p24"/>
+          <p:cNvPr id="249" name="Google Shape;249;p24"/>
           <p:cNvSpPr txBox="1"/>
           <p:nvPr/>
         </p:nvSpPr>
@@ -12869,7 +12870,7 @@
       </p:sp>
       <p:sp>
         <p:nvSpPr>
-          <p:cNvPr id="248" name="Google Shape;248;p24"/>
+          <p:cNvPr id="250" name="Google Shape;250;p24"/>
           <p:cNvSpPr/>
           <p:nvPr/>
         </p:nvSpPr>
@@ -12918,7 +12919,7 @@
       </p:sp>
       <p:sp>
         <p:nvSpPr>
-          <p:cNvPr id="249" name="Google Shape;249;p24"/>
+          <p:cNvPr id="251" name="Google Shape;251;p24"/>
           <p:cNvSpPr/>
           <p:nvPr/>
         </p:nvSpPr>
@@ -12967,7 +12968,7 @@
       </p:sp>
       <p:sp>
         <p:nvSpPr>
-          <p:cNvPr id="250" name="Google Shape;250;p24"/>
+          <p:cNvPr id="252" name="Google Shape;252;p24"/>
           <p:cNvSpPr/>
           <p:nvPr/>
         </p:nvSpPr>
@@ -13016,7 +13017,7 @@
       </p:sp>
       <p:sp>
         <p:nvSpPr>
-          <p:cNvPr id="251" name="Google Shape;251;p24"/>
+          <p:cNvPr id="253" name="Google Shape;253;p24"/>
           <p:cNvSpPr/>
           <p:nvPr/>
         </p:nvSpPr>
@@ -13065,7 +13066,7 @@
       </p:sp>
       <p:sp>
         <p:nvSpPr>
-          <p:cNvPr id="252" name="Google Shape;252;p24"/>
+          <p:cNvPr id="254" name="Google Shape;254;p24"/>
           <p:cNvSpPr/>
           <p:nvPr/>
         </p:nvSpPr>
@@ -13114,7 +13115,7 @@
       </p:sp>
       <p:sp>
         <p:nvSpPr>
-          <p:cNvPr id="253" name="Google Shape;253;p24"/>
+          <p:cNvPr id="255" name="Google Shape;255;p24"/>
           <p:cNvSpPr/>
           <p:nvPr/>
         </p:nvSpPr>
@@ -13163,7 +13164,7 @@
       </p:sp>
       <p:sp>
         <p:nvSpPr>
-          <p:cNvPr id="254" name="Google Shape;254;p24"/>
+          <p:cNvPr id="256" name="Google Shape;256;p24"/>
           <p:cNvSpPr/>
           <p:nvPr/>
         </p:nvSpPr>
@@ -13212,7 +13213,7 @@
       </p:sp>
       <p:sp>
         <p:nvSpPr>
-          <p:cNvPr id="255" name="Google Shape;255;p24"/>
+          <p:cNvPr id="257" name="Google Shape;257;p24"/>
           <p:cNvSpPr/>
           <p:nvPr/>
         </p:nvSpPr>
@@ -13262,13 +13263,13 @@
       </p:sp>
       <p:cxnSp>
         <p:nvCxnSpPr>
-          <p:cNvPr id="256" name="Google Shape;256;p24"/>
+          <p:cNvPr id="258" name="Google Shape;258;p24"/>
           <p:cNvCxnSpPr/>
           <p:nvPr/>
         </p:nvCxnSpPr>
         <p:spPr>
           <a:xfrm>
-            <a:off x="1020825" y="3870750"/>
+            <a:off x="1097025" y="3870750"/>
             <a:ext cx="8400" cy="257700"/>
           </a:xfrm>
           <a:prstGeom prst="straightConnector1">
@@ -13288,7 +13289,7 @@
       </p:cxnSp>
       <p:sp>
         <p:nvSpPr>
-          <p:cNvPr id="257" name="Google Shape;257;p24"/>
+          <p:cNvPr id="259" name="Google Shape;259;p24"/>
           <p:cNvSpPr txBox="1"/>
           <p:nvPr/>
         </p:nvSpPr>
@@ -13373,7 +13374,7 @@
   <p:cSld>
     <p:spTree>
       <p:nvGrpSpPr>
-        <p:cNvPr id="261" name="Shape 261"/>
+        <p:cNvPr id="263" name="Shape 263"/>
         <p:cNvGrpSpPr/>
         <p:nvPr/>
       </p:nvGrpSpPr>
@@ -13387,7 +13388,7 @@
       </p:grpSpPr>
       <p:sp>
         <p:nvSpPr>
-          <p:cNvPr id="262" name="Google Shape;262;p25"/>
+          <p:cNvPr id="264" name="Google Shape;264;p25"/>
           <p:cNvSpPr/>
           <p:nvPr/>
         </p:nvSpPr>
@@ -13436,7 +13437,7 @@
       </p:sp>
       <p:sp>
         <p:nvSpPr>
-          <p:cNvPr id="263" name="Google Shape;263;p25"/>
+          <p:cNvPr id="265" name="Google Shape;265;p25"/>
           <p:cNvSpPr txBox="1"/>
           <p:nvPr>
             <p:ph type="title"/>
@@ -13476,7 +13477,7 @@
       </p:sp>
       <p:sp>
         <p:nvSpPr>
-          <p:cNvPr id="264" name="Google Shape;264;p25"/>
+          <p:cNvPr id="266" name="Google Shape;266;p25"/>
           <p:cNvSpPr txBox="1"/>
           <p:nvPr>
             <p:ph idx="1" type="body"/>
@@ -13549,7 +13550,7 @@
       </p:sp>
       <p:grpSp>
         <p:nvGrpSpPr>
-          <p:cNvPr id="265" name="Google Shape;265;p25"/>
+          <p:cNvPr id="267" name="Google Shape;267;p25"/>
           <p:cNvGrpSpPr/>
           <p:nvPr/>
         </p:nvGrpSpPr>
@@ -13563,7 +13564,7 @@
         </p:grpSpPr>
         <p:sp>
           <p:nvSpPr>
-            <p:cNvPr id="266" name="Google Shape;266;p25"/>
+            <p:cNvPr id="268" name="Google Shape;268;p25"/>
             <p:cNvSpPr/>
             <p:nvPr/>
           </p:nvSpPr>
@@ -13612,7 +13613,7 @@
         </p:sp>
         <p:grpSp>
           <p:nvGrpSpPr>
-            <p:cNvPr id="267" name="Google Shape;267;p25"/>
+            <p:cNvPr id="269" name="Google Shape;269;p25"/>
             <p:cNvGrpSpPr/>
             <p:nvPr/>
           </p:nvGrpSpPr>
@@ -13626,7 +13627,7 @@
           </p:grpSpPr>
           <p:sp>
             <p:nvSpPr>
-              <p:cNvPr id="268" name="Google Shape;268;p25"/>
+              <p:cNvPr id="270" name="Google Shape;270;p25"/>
               <p:cNvSpPr/>
               <p:nvPr/>
             </p:nvSpPr>
@@ -13675,7 +13676,7 @@
           </p:sp>
           <p:sp>
             <p:nvSpPr>
-              <p:cNvPr id="269" name="Google Shape;269;p25"/>
+              <p:cNvPr id="271" name="Google Shape;271;p25"/>
               <p:cNvSpPr/>
               <p:nvPr/>
             </p:nvSpPr>
@@ -13724,7 +13725,7 @@
           </p:sp>
           <p:sp>
             <p:nvSpPr>
-              <p:cNvPr id="270" name="Google Shape;270;p25"/>
+              <p:cNvPr id="272" name="Google Shape;272;p25"/>
               <p:cNvSpPr/>
               <p:nvPr/>
             </p:nvSpPr>
@@ -13773,7 +13774,7 @@
           </p:sp>
           <p:sp>
             <p:nvSpPr>
-              <p:cNvPr id="271" name="Google Shape;271;p25"/>
+              <p:cNvPr id="273" name="Google Shape;273;p25"/>
               <p:cNvSpPr/>
               <p:nvPr/>
             </p:nvSpPr>
@@ -13822,7 +13823,7 @@
           </p:sp>
           <p:sp>
             <p:nvSpPr>
-              <p:cNvPr id="272" name="Google Shape;272;p25"/>
+              <p:cNvPr id="274" name="Google Shape;274;p25"/>
               <p:cNvSpPr/>
               <p:nvPr/>
             </p:nvSpPr>
@@ -13871,7 +13872,7 @@
           </p:sp>
           <p:sp>
             <p:nvSpPr>
-              <p:cNvPr id="273" name="Google Shape;273;p25"/>
+              <p:cNvPr id="275" name="Google Shape;275;p25"/>
               <p:cNvSpPr/>
               <p:nvPr/>
             </p:nvSpPr>
@@ -13920,9 +13921,9 @@
           </p:sp>
           <p:cxnSp>
             <p:nvCxnSpPr>
-              <p:cNvPr id="274" name="Google Shape;274;p25"/>
+              <p:cNvPr id="276" name="Google Shape;276;p25"/>
               <p:cNvCxnSpPr>
-                <a:endCxn id="270" idx="2"/>
+                <a:endCxn id="272" idx="2"/>
               </p:cNvCxnSpPr>
               <p:nvPr/>
             </p:nvCxnSpPr>
@@ -13948,10 +13949,10 @@
           </p:cxnSp>
           <p:cxnSp>
             <p:nvCxnSpPr>
-              <p:cNvPr id="275" name="Google Shape;275;p25"/>
+              <p:cNvPr id="277" name="Google Shape;277;p25"/>
               <p:cNvCxnSpPr>
-                <a:stCxn id="270" idx="6"/>
-                <a:endCxn id="271" idx="2"/>
+                <a:stCxn id="272" idx="6"/>
+                <a:endCxn id="273" idx="2"/>
               </p:cNvCxnSpPr>
               <p:nvPr/>
             </p:nvCxnSpPr>
@@ -13977,10 +13978,10 @@
           </p:cxnSp>
           <p:cxnSp>
             <p:nvCxnSpPr>
-              <p:cNvPr id="276" name="Google Shape;276;p25"/>
+              <p:cNvPr id="278" name="Google Shape;278;p25"/>
               <p:cNvCxnSpPr>
-                <a:stCxn id="271" idx="7"/>
-                <a:endCxn id="272" idx="1"/>
+                <a:stCxn id="273" idx="7"/>
+                <a:endCxn id="274" idx="1"/>
               </p:cNvCxnSpPr>
               <p:nvPr/>
             </p:nvCxnSpPr>
@@ -14008,10 +14009,10 @@
           </p:cxnSp>
           <p:cxnSp>
             <p:nvCxnSpPr>
-              <p:cNvPr id="277" name="Google Shape;277;p25"/>
+              <p:cNvPr id="279" name="Google Shape;279;p25"/>
               <p:cNvCxnSpPr>
-                <a:stCxn id="272" idx="3"/>
-                <a:endCxn id="271" idx="5"/>
+                <a:stCxn id="274" idx="3"/>
+                <a:endCxn id="273" idx="5"/>
               </p:cNvCxnSpPr>
               <p:nvPr/>
             </p:nvCxnSpPr>
@@ -14039,10 +14040,10 @@
           </p:cxnSp>
           <p:cxnSp>
             <p:nvCxnSpPr>
-              <p:cNvPr id="278" name="Google Shape;278;p25"/>
+              <p:cNvPr id="280" name="Google Shape;280;p25"/>
               <p:cNvCxnSpPr>
-                <a:stCxn id="272" idx="4"/>
-                <a:endCxn id="273" idx="6"/>
+                <a:stCxn id="274" idx="4"/>
+                <a:endCxn id="275" idx="6"/>
               </p:cNvCxnSpPr>
               <p:nvPr/>
             </p:nvCxnSpPr>
@@ -14068,10 +14069,10 @@
           </p:cxnSp>
           <p:cxnSp>
             <p:nvCxnSpPr>
-              <p:cNvPr id="279" name="Google Shape;279;p25"/>
+              <p:cNvPr id="281" name="Google Shape;281;p25"/>
               <p:cNvCxnSpPr>
-                <a:stCxn id="273" idx="2"/>
-                <a:endCxn id="271" idx="4"/>
+                <a:stCxn id="275" idx="2"/>
+                <a:endCxn id="273" idx="4"/>
               </p:cNvCxnSpPr>
               <p:nvPr/>
             </p:nvCxnSpPr>
@@ -14097,10 +14098,10 @@
           </p:cxnSp>
           <p:cxnSp>
             <p:nvCxnSpPr>
-              <p:cNvPr id="280" name="Google Shape;280;p25"/>
+              <p:cNvPr id="282" name="Google Shape;282;p25"/>
               <p:cNvCxnSpPr>
-                <a:stCxn id="272" idx="6"/>
-                <a:endCxn id="268" idx="2"/>
+                <a:stCxn id="274" idx="6"/>
+                <a:endCxn id="270" idx="2"/>
               </p:cNvCxnSpPr>
               <p:nvPr/>
             </p:nvCxnSpPr>
@@ -14128,7 +14129,7 @@
       </p:grpSp>
       <p:sp>
         <p:nvSpPr>
-          <p:cNvPr id="281" name="Google Shape;281;p25"/>
+          <p:cNvPr id="283" name="Google Shape;283;p25"/>
           <p:cNvSpPr/>
           <p:nvPr/>
         </p:nvSpPr>
@@ -14177,7 +14178,7 @@
       </p:sp>
       <p:sp>
         <p:nvSpPr>
-          <p:cNvPr id="282" name="Google Shape;282;p25"/>
+          <p:cNvPr id="284" name="Google Shape;284;p25"/>
           <p:cNvSpPr/>
           <p:nvPr/>
         </p:nvSpPr>
@@ -14226,7 +14227,7 @@
       </p:sp>
       <p:sp>
         <p:nvSpPr>
-          <p:cNvPr id="283" name="Google Shape;283;p25"/>
+          <p:cNvPr id="285" name="Google Shape;285;p25"/>
           <p:cNvSpPr/>
           <p:nvPr/>
         </p:nvSpPr>
@@ -14275,7 +14276,7 @@
       </p:sp>
       <p:sp>
         <p:nvSpPr>
-          <p:cNvPr id="284" name="Google Shape;284;p25"/>
+          <p:cNvPr id="286" name="Google Shape;286;p25"/>
           <p:cNvSpPr/>
           <p:nvPr/>
         </p:nvSpPr>
@@ -14324,7 +14325,7 @@
       </p:sp>
       <p:sp>
         <p:nvSpPr>
-          <p:cNvPr id="285" name="Google Shape;285;p25"/>
+          <p:cNvPr id="287" name="Google Shape;287;p25"/>
           <p:cNvSpPr/>
           <p:nvPr/>
         </p:nvSpPr>
@@ -14373,7 +14374,7 @@
       </p:sp>
       <p:sp>
         <p:nvSpPr>
-          <p:cNvPr id="286" name="Google Shape;286;p25"/>
+          <p:cNvPr id="288" name="Google Shape;288;p25"/>
           <p:cNvSpPr/>
           <p:nvPr/>
         </p:nvSpPr>
@@ -14423,7 +14424,7 @@
       </p:sp>
       <p:sp>
         <p:nvSpPr>
-          <p:cNvPr id="287" name="Google Shape;287;p25"/>
+          <p:cNvPr id="289" name="Google Shape;289;p25"/>
           <p:cNvSpPr/>
           <p:nvPr/>
         </p:nvSpPr>
@@ -14473,7 +14474,7 @@
       </p:sp>
       <p:sp>
         <p:nvSpPr>
-          <p:cNvPr id="288" name="Google Shape;288;p25"/>
+          <p:cNvPr id="290" name="Google Shape;290;p25"/>
           <p:cNvSpPr/>
           <p:nvPr/>
         </p:nvSpPr>
@@ -14523,7 +14524,7 @@
       </p:sp>
       <p:sp>
         <p:nvSpPr>
-          <p:cNvPr id="289" name="Google Shape;289;p25"/>
+          <p:cNvPr id="291" name="Google Shape;291;p25"/>
           <p:cNvSpPr/>
           <p:nvPr/>
         </p:nvSpPr>
@@ -14573,7 +14574,7 @@
       </p:sp>
       <p:sp>
         <p:nvSpPr>
-          <p:cNvPr id="290" name="Google Shape;290;p25"/>
+          <p:cNvPr id="292" name="Google Shape;292;p25"/>
           <p:cNvSpPr/>
           <p:nvPr/>
         </p:nvSpPr>
@@ -14623,7 +14624,7 @@
       </p:sp>
       <p:sp>
         <p:nvSpPr>
-          <p:cNvPr id="291" name="Google Shape;291;p25"/>
+          <p:cNvPr id="293" name="Google Shape;293;p25"/>
           <p:cNvSpPr/>
           <p:nvPr/>
         </p:nvSpPr>
@@ -14673,7 +14674,7 @@
       </p:sp>
       <p:sp>
         <p:nvSpPr>
-          <p:cNvPr id="292" name="Google Shape;292;p25"/>
+          <p:cNvPr id="294" name="Google Shape;294;p25"/>
           <p:cNvSpPr/>
           <p:nvPr/>
         </p:nvSpPr>
@@ -14723,7 +14724,7 @@
       </p:sp>
       <p:cxnSp>
         <p:nvCxnSpPr>
-          <p:cNvPr id="293" name="Google Shape;293;p25"/>
+          <p:cNvPr id="295" name="Google Shape;295;p25"/>
           <p:cNvCxnSpPr/>
           <p:nvPr/>
         </p:nvCxnSpPr>
@@ -14749,7 +14750,7 @@
       </p:cxnSp>
       <p:cxnSp>
         <p:nvCxnSpPr>
-          <p:cNvPr id="294" name="Google Shape;294;p25"/>
+          <p:cNvPr id="296" name="Google Shape;296;p25"/>
           <p:cNvCxnSpPr/>
           <p:nvPr/>
         </p:nvCxnSpPr>
@@ -14775,7 +14776,7 @@
       </p:cxnSp>
       <p:sp>
         <p:nvSpPr>
-          <p:cNvPr id="295" name="Google Shape;295;p25"/>
+          <p:cNvPr id="297" name="Google Shape;297;p25"/>
           <p:cNvSpPr txBox="1"/>
           <p:nvPr/>
         </p:nvSpPr>
@@ -14817,7 +14818,7 @@
       </p:sp>
       <p:cxnSp>
         <p:nvCxnSpPr>
-          <p:cNvPr id="296" name="Google Shape;296;p25"/>
+          <p:cNvPr id="298" name="Google Shape;298;p25"/>
           <p:cNvCxnSpPr/>
           <p:nvPr/>
         </p:nvCxnSpPr>
@@ -14843,7 +14844,7 @@
       </p:cxnSp>
       <p:sp>
         <p:nvSpPr>
-          <p:cNvPr id="297" name="Google Shape;297;p25"/>
+          <p:cNvPr id="299" name="Google Shape;299;p25"/>
           <p:cNvSpPr txBox="1"/>
           <p:nvPr/>
         </p:nvSpPr>
@@ -14885,7 +14886,7 @@
       </p:sp>
       <p:sp>
         <p:nvSpPr>
-          <p:cNvPr id="298" name="Google Shape;298;p25"/>
+          <p:cNvPr id="300" name="Google Shape;300;p25"/>
           <p:cNvSpPr/>
           <p:nvPr/>
         </p:nvSpPr>
@@ -14934,7 +14935,7 @@
       </p:sp>
       <p:sp>
         <p:nvSpPr>
-          <p:cNvPr id="299" name="Google Shape;299;p25"/>
+          <p:cNvPr id="301" name="Google Shape;301;p25"/>
           <p:cNvSpPr/>
           <p:nvPr/>
         </p:nvSpPr>
@@ -14983,7 +14984,7 @@
       </p:sp>
       <p:sp>
         <p:nvSpPr>
-          <p:cNvPr id="300" name="Google Shape;300;p25"/>
+          <p:cNvPr id="302" name="Google Shape;302;p25"/>
           <p:cNvSpPr/>
           <p:nvPr/>
         </p:nvSpPr>
@@ -15032,7 +15033,7 @@
       </p:sp>
       <p:sp>
         <p:nvSpPr>
-          <p:cNvPr id="301" name="Google Shape;301;p25"/>
+          <p:cNvPr id="303" name="Google Shape;303;p25"/>
           <p:cNvSpPr/>
           <p:nvPr/>
         </p:nvSpPr>
@@ -15081,7 +15082,7 @@
       </p:sp>
       <p:sp>
         <p:nvSpPr>
-          <p:cNvPr id="302" name="Google Shape;302;p25"/>
+          <p:cNvPr id="304" name="Google Shape;304;p25"/>
           <p:cNvSpPr/>
           <p:nvPr/>
         </p:nvSpPr>
@@ -15130,7 +15131,7 @@
       </p:sp>
       <p:sp>
         <p:nvSpPr>
-          <p:cNvPr id="303" name="Google Shape;303;p25"/>
+          <p:cNvPr id="305" name="Google Shape;305;p25"/>
           <p:cNvSpPr/>
           <p:nvPr/>
         </p:nvSpPr>
@@ -15179,7 +15180,7 @@
       </p:sp>
       <p:sp>
         <p:nvSpPr>
-          <p:cNvPr id="304" name="Google Shape;304;p25"/>
+          <p:cNvPr id="306" name="Google Shape;306;p25"/>
           <p:cNvSpPr/>
           <p:nvPr/>
         </p:nvSpPr>
@@ -15228,7 +15229,7 @@
       </p:sp>
       <p:sp>
         <p:nvSpPr>
-          <p:cNvPr id="305" name="Google Shape;305;p25"/>
+          <p:cNvPr id="307" name="Google Shape;307;p25"/>
           <p:cNvSpPr/>
           <p:nvPr/>
         </p:nvSpPr>
@@ -15278,7 +15279,7 @@
       </p:sp>
       <p:cxnSp>
         <p:nvCxnSpPr>
-          <p:cNvPr id="306" name="Google Shape;306;p25"/>
+          <p:cNvPr id="308" name="Google Shape;308;p25"/>
           <p:cNvCxnSpPr/>
           <p:nvPr/>
         </p:nvCxnSpPr>
@@ -15304,7 +15305,7 @@
       </p:cxnSp>
       <p:sp>
         <p:nvSpPr>
-          <p:cNvPr id="307" name="Google Shape;307;p25"/>
+          <p:cNvPr id="309" name="Google Shape;309;p25"/>
           <p:cNvSpPr/>
           <p:nvPr/>
         </p:nvSpPr>
@@ -15354,7 +15355,7 @@
       </p:sp>
       <p:sp>
         <p:nvSpPr>
-          <p:cNvPr id="308" name="Google Shape;308;p25"/>
+          <p:cNvPr id="310" name="Google Shape;310;p25"/>
           <p:cNvSpPr txBox="1"/>
           <p:nvPr/>
         </p:nvSpPr>
@@ -15439,7 +15440,7 @@
   <p:cSld>
     <p:spTree>
       <p:nvGrpSpPr>
-        <p:cNvPr id="312" name="Shape 312"/>
+        <p:cNvPr id="314" name="Shape 314"/>
         <p:cNvGrpSpPr/>
         <p:nvPr/>
       </p:nvGrpSpPr>
@@ -15453,7 +15454,7 @@
       </p:grpSpPr>
       <p:sp>
         <p:nvSpPr>
-          <p:cNvPr id="313" name="Google Shape;313;p26"/>
+          <p:cNvPr id="315" name="Google Shape;315;p26"/>
           <p:cNvSpPr txBox="1"/>
           <p:nvPr>
             <p:ph idx="1" type="body"/>
@@ -15582,7 +15583,7 @@
       </p:sp>
       <p:sp>
         <p:nvSpPr>
-          <p:cNvPr id="314" name="Google Shape;314;p26"/>
+          <p:cNvPr id="316" name="Google Shape;316;p26"/>
           <p:cNvSpPr/>
           <p:nvPr/>
         </p:nvSpPr>
@@ -15631,7 +15632,7 @@
       </p:sp>
       <p:sp>
         <p:nvSpPr>
-          <p:cNvPr id="315" name="Google Shape;315;p26"/>
+          <p:cNvPr id="317" name="Google Shape;317;p26"/>
           <p:cNvSpPr txBox="1"/>
           <p:nvPr>
             <p:ph type="title"/>
@@ -15671,7 +15672,7 @@
       </p:sp>
       <p:grpSp>
         <p:nvGrpSpPr>
-          <p:cNvPr id="316" name="Google Shape;316;p26"/>
+          <p:cNvPr id="318" name="Google Shape;318;p26"/>
           <p:cNvGrpSpPr/>
           <p:nvPr/>
         </p:nvGrpSpPr>
@@ -15685,7 +15686,7 @@
         </p:grpSpPr>
         <p:sp>
           <p:nvSpPr>
-            <p:cNvPr id="317" name="Google Shape;317;p26"/>
+            <p:cNvPr id="319" name="Google Shape;319;p26"/>
             <p:cNvSpPr/>
             <p:nvPr/>
           </p:nvSpPr>
@@ -15734,7 +15735,7 @@
         </p:sp>
         <p:grpSp>
           <p:nvGrpSpPr>
-            <p:cNvPr id="318" name="Google Shape;318;p26"/>
+            <p:cNvPr id="320" name="Google Shape;320;p26"/>
             <p:cNvGrpSpPr/>
             <p:nvPr/>
           </p:nvGrpSpPr>
@@ -15748,7 +15749,7 @@
           </p:grpSpPr>
           <p:sp>
             <p:nvSpPr>
-              <p:cNvPr id="319" name="Google Shape;319;p26"/>
+              <p:cNvPr id="321" name="Google Shape;321;p26"/>
               <p:cNvSpPr/>
               <p:nvPr/>
             </p:nvSpPr>
@@ -15797,7 +15798,7 @@
           </p:sp>
           <p:sp>
             <p:nvSpPr>
-              <p:cNvPr id="320" name="Google Shape;320;p26"/>
+              <p:cNvPr id="322" name="Google Shape;322;p26"/>
               <p:cNvSpPr/>
               <p:nvPr/>
             </p:nvSpPr>
@@ -15846,7 +15847,7 @@
           </p:sp>
           <p:sp>
             <p:nvSpPr>
-              <p:cNvPr id="321" name="Google Shape;321;p26"/>
+              <p:cNvPr id="323" name="Google Shape;323;p26"/>
               <p:cNvSpPr/>
               <p:nvPr/>
             </p:nvSpPr>
@@ -15895,7 +15896,7 @@
           </p:sp>
           <p:sp>
             <p:nvSpPr>
-              <p:cNvPr id="322" name="Google Shape;322;p26"/>
+              <p:cNvPr id="324" name="Google Shape;324;p26"/>
               <p:cNvSpPr/>
               <p:nvPr/>
             </p:nvSpPr>
@@ -15944,7 +15945,7 @@
           </p:sp>
           <p:sp>
             <p:nvSpPr>
-              <p:cNvPr id="323" name="Google Shape;323;p26"/>
+              <p:cNvPr id="325" name="Google Shape;325;p26"/>
               <p:cNvSpPr/>
               <p:nvPr/>
             </p:nvSpPr>
@@ -15993,7 +15994,7 @@
           </p:sp>
           <p:sp>
             <p:nvSpPr>
-              <p:cNvPr id="324" name="Google Shape;324;p26"/>
+              <p:cNvPr id="326" name="Google Shape;326;p26"/>
               <p:cNvSpPr/>
               <p:nvPr/>
             </p:nvSpPr>
@@ -16042,9 +16043,9 @@
           </p:sp>
           <p:cxnSp>
             <p:nvCxnSpPr>
-              <p:cNvPr id="325" name="Google Shape;325;p26"/>
+              <p:cNvPr id="327" name="Google Shape;327;p26"/>
               <p:cNvCxnSpPr>
-                <a:endCxn id="321" idx="2"/>
+                <a:endCxn id="323" idx="2"/>
               </p:cNvCxnSpPr>
               <p:nvPr/>
             </p:nvCxnSpPr>
@@ -16070,10 +16071,10 @@
           </p:cxnSp>
           <p:cxnSp>
             <p:nvCxnSpPr>
-              <p:cNvPr id="326" name="Google Shape;326;p26"/>
+              <p:cNvPr id="328" name="Google Shape;328;p26"/>
               <p:cNvCxnSpPr>
-                <a:stCxn id="321" idx="6"/>
-                <a:endCxn id="322" idx="2"/>
+                <a:stCxn id="323" idx="6"/>
+                <a:endCxn id="324" idx="2"/>
               </p:cNvCxnSpPr>
               <p:nvPr/>
             </p:nvCxnSpPr>
@@ -16099,10 +16100,10 @@
           </p:cxnSp>
           <p:cxnSp>
             <p:nvCxnSpPr>
-              <p:cNvPr id="327" name="Google Shape;327;p26"/>
+              <p:cNvPr id="329" name="Google Shape;329;p26"/>
               <p:cNvCxnSpPr>
-                <a:stCxn id="322" idx="7"/>
-                <a:endCxn id="323" idx="1"/>
+                <a:stCxn id="324" idx="7"/>
+                <a:endCxn id="325" idx="1"/>
               </p:cNvCxnSpPr>
               <p:nvPr/>
             </p:nvCxnSpPr>
@@ -16130,10 +16131,10 @@
           </p:cxnSp>
           <p:cxnSp>
             <p:nvCxnSpPr>
-              <p:cNvPr id="328" name="Google Shape;328;p26"/>
+              <p:cNvPr id="330" name="Google Shape;330;p26"/>
               <p:cNvCxnSpPr>
-                <a:stCxn id="323" idx="3"/>
-                <a:endCxn id="322" idx="5"/>
+                <a:stCxn id="325" idx="3"/>
+                <a:endCxn id="324" idx="5"/>
               </p:cNvCxnSpPr>
               <p:nvPr/>
             </p:nvCxnSpPr>
@@ -16161,10 +16162,10 @@
           </p:cxnSp>
           <p:cxnSp>
             <p:nvCxnSpPr>
-              <p:cNvPr id="329" name="Google Shape;329;p26"/>
+              <p:cNvPr id="331" name="Google Shape;331;p26"/>
               <p:cNvCxnSpPr>
-                <a:stCxn id="323" idx="4"/>
-                <a:endCxn id="324" idx="6"/>
+                <a:stCxn id="325" idx="4"/>
+                <a:endCxn id="326" idx="6"/>
               </p:cNvCxnSpPr>
               <p:nvPr/>
             </p:nvCxnSpPr>
@@ -16190,10 +16191,10 @@
           </p:cxnSp>
           <p:cxnSp>
             <p:nvCxnSpPr>
-              <p:cNvPr id="330" name="Google Shape;330;p26"/>
+              <p:cNvPr id="332" name="Google Shape;332;p26"/>
               <p:cNvCxnSpPr>
-                <a:stCxn id="324" idx="2"/>
-                <a:endCxn id="322" idx="4"/>
+                <a:stCxn id="326" idx="2"/>
+                <a:endCxn id="324" idx="4"/>
               </p:cNvCxnSpPr>
               <p:nvPr/>
             </p:nvCxnSpPr>
@@ -16219,10 +16220,10 @@
           </p:cxnSp>
           <p:cxnSp>
             <p:nvCxnSpPr>
-              <p:cNvPr id="331" name="Google Shape;331;p26"/>
+              <p:cNvPr id="333" name="Google Shape;333;p26"/>
               <p:cNvCxnSpPr>
-                <a:stCxn id="323" idx="6"/>
-                <a:endCxn id="319" idx="2"/>
+                <a:stCxn id="325" idx="6"/>
+                <a:endCxn id="321" idx="2"/>
               </p:cNvCxnSpPr>
               <p:nvPr/>
             </p:nvCxnSpPr>
@@ -16250,7 +16251,7 @@
       </p:grpSp>
       <p:sp>
         <p:nvSpPr>
-          <p:cNvPr id="332" name="Google Shape;332;p26"/>
+          <p:cNvPr id="334" name="Google Shape;334;p26"/>
           <p:cNvSpPr/>
           <p:nvPr/>
         </p:nvSpPr>
@@ -16299,7 +16300,7 @@
       </p:sp>
       <p:sp>
         <p:nvSpPr>
-          <p:cNvPr id="333" name="Google Shape;333;p26"/>
+          <p:cNvPr id="335" name="Google Shape;335;p26"/>
           <p:cNvSpPr/>
           <p:nvPr/>
         </p:nvSpPr>
@@ -16348,7 +16349,7 @@
       </p:sp>
       <p:sp>
         <p:nvSpPr>
-          <p:cNvPr id="334" name="Google Shape;334;p26"/>
+          <p:cNvPr id="336" name="Google Shape;336;p26"/>
           <p:cNvSpPr/>
           <p:nvPr/>
         </p:nvSpPr>
@@ -16397,7 +16398,7 @@
       </p:sp>
       <p:sp>
         <p:nvSpPr>
-          <p:cNvPr id="335" name="Google Shape;335;p26"/>
+          <p:cNvPr id="337" name="Google Shape;337;p26"/>
           <p:cNvSpPr/>
           <p:nvPr/>
         </p:nvSpPr>
@@ -16446,7 +16447,7 @@
       </p:sp>
       <p:sp>
         <p:nvSpPr>
-          <p:cNvPr id="336" name="Google Shape;336;p26"/>
+          <p:cNvPr id="338" name="Google Shape;338;p26"/>
           <p:cNvSpPr/>
           <p:nvPr/>
         </p:nvSpPr>
@@ -16495,7 +16496,7 @@
       </p:sp>
       <p:sp>
         <p:nvSpPr>
-          <p:cNvPr id="337" name="Google Shape;337;p26"/>
+          <p:cNvPr id="339" name="Google Shape;339;p26"/>
           <p:cNvSpPr/>
           <p:nvPr/>
         </p:nvSpPr>
@@ -16545,7 +16546,7 @@
       </p:sp>
       <p:sp>
         <p:nvSpPr>
-          <p:cNvPr id="338" name="Google Shape;338;p26"/>
+          <p:cNvPr id="340" name="Google Shape;340;p26"/>
           <p:cNvSpPr txBox="1"/>
           <p:nvPr/>
         </p:nvSpPr>
@@ -16587,7 +16588,7 @@
       </p:sp>
       <p:sp>
         <p:nvSpPr>
-          <p:cNvPr id="339" name="Google Shape;339;p26"/>
+          <p:cNvPr id="341" name="Google Shape;341;p26"/>
           <p:cNvSpPr/>
           <p:nvPr/>
         </p:nvSpPr>
@@ -16637,7 +16638,7 @@
       </p:sp>
       <p:sp>
         <p:nvSpPr>
-          <p:cNvPr id="340" name="Google Shape;340;p26"/>
+          <p:cNvPr id="342" name="Google Shape;342;p26"/>
           <p:cNvSpPr/>
           <p:nvPr/>
         </p:nvSpPr>
@@ -16687,7 +16688,7 @@
       </p:sp>
       <p:sp>
         <p:nvSpPr>
-          <p:cNvPr id="341" name="Google Shape;341;p26"/>
+          <p:cNvPr id="343" name="Google Shape;343;p26"/>
           <p:cNvSpPr/>
           <p:nvPr/>
         </p:nvSpPr>
@@ -16737,7 +16738,7 @@
       </p:sp>
       <p:sp>
         <p:nvSpPr>
-          <p:cNvPr id="342" name="Google Shape;342;p26"/>
+          <p:cNvPr id="344" name="Google Shape;344;p26"/>
           <p:cNvSpPr/>
           <p:nvPr/>
         </p:nvSpPr>
@@ -16787,7 +16788,7 @@
       </p:sp>
       <p:sp>
         <p:nvSpPr>
-          <p:cNvPr id="343" name="Google Shape;343;p26"/>
+          <p:cNvPr id="345" name="Google Shape;345;p26"/>
           <p:cNvSpPr/>
           <p:nvPr/>
         </p:nvSpPr>
@@ -16837,7 +16838,7 @@
       </p:sp>
       <p:sp>
         <p:nvSpPr>
-          <p:cNvPr id="344" name="Google Shape;344;p26"/>
+          <p:cNvPr id="346" name="Google Shape;346;p26"/>
           <p:cNvSpPr/>
           <p:nvPr/>
         </p:nvSpPr>
@@ -16887,7 +16888,7 @@
       </p:sp>
       <p:cxnSp>
         <p:nvCxnSpPr>
-          <p:cNvPr id="345" name="Google Shape;345;p26"/>
+          <p:cNvPr id="347" name="Google Shape;347;p26"/>
           <p:cNvCxnSpPr/>
           <p:nvPr/>
         </p:nvCxnSpPr>
@@ -16913,13 +16914,13 @@
       </p:cxnSp>
       <p:cxnSp>
         <p:nvCxnSpPr>
-          <p:cNvPr id="346" name="Google Shape;346;p26"/>
+          <p:cNvPr id="348" name="Google Shape;348;p26"/>
           <p:cNvCxnSpPr/>
           <p:nvPr/>
         </p:nvCxnSpPr>
         <p:spPr>
           <a:xfrm rot="10800000">
-            <a:off x="6105601" y="2857350"/>
+            <a:off x="6943801" y="2857350"/>
             <a:ext cx="900" cy="363600"/>
           </a:xfrm>
           <a:prstGeom prst="straightConnector1">
@@ -16939,7 +16940,7 @@
       </p:cxnSp>
       <p:sp>
         <p:nvSpPr>
-          <p:cNvPr id="347" name="Google Shape;347;p26"/>
+          <p:cNvPr id="349" name="Google Shape;349;p26"/>
           <p:cNvSpPr txBox="1"/>
           <p:nvPr/>
         </p:nvSpPr>
@@ -16981,7 +16982,7 @@
       </p:sp>
       <p:sp>
         <p:nvSpPr>
-          <p:cNvPr id="348" name="Google Shape;348;p26"/>
+          <p:cNvPr id="350" name="Google Shape;350;p26"/>
           <p:cNvSpPr txBox="1"/>
           <p:nvPr/>
         </p:nvSpPr>
@@ -17023,7 +17024,7 @@
       </p:sp>
       <p:sp>
         <p:nvSpPr>
-          <p:cNvPr id="349" name="Google Shape;349;p26"/>
+          <p:cNvPr id="351" name="Google Shape;351;p26"/>
           <p:cNvSpPr/>
           <p:nvPr/>
         </p:nvSpPr>
@@ -17072,7 +17073,7 @@
       </p:sp>
       <p:sp>
         <p:nvSpPr>
-          <p:cNvPr id="350" name="Google Shape;350;p26"/>
+          <p:cNvPr id="352" name="Google Shape;352;p26"/>
           <p:cNvSpPr/>
           <p:nvPr/>
         </p:nvSpPr>
@@ -17121,7 +17122,7 @@
       </p:sp>
       <p:sp>
         <p:nvSpPr>
-          <p:cNvPr id="351" name="Google Shape;351;p26"/>
+          <p:cNvPr id="353" name="Google Shape;353;p26"/>
           <p:cNvSpPr/>
           <p:nvPr/>
         </p:nvSpPr>
@@ -17170,7 +17171,7 @@
       </p:sp>
       <p:sp>
         <p:nvSpPr>
-          <p:cNvPr id="352" name="Google Shape;352;p26"/>
+          <p:cNvPr id="354" name="Google Shape;354;p26"/>
           <p:cNvSpPr/>
           <p:nvPr/>
         </p:nvSpPr>
@@ -17219,7 +17220,7 @@
       </p:sp>
       <p:sp>
         <p:nvSpPr>
-          <p:cNvPr id="353" name="Google Shape;353;p26"/>
+          <p:cNvPr id="355" name="Google Shape;355;p26"/>
           <p:cNvSpPr/>
           <p:nvPr/>
         </p:nvSpPr>
@@ -17268,7 +17269,7 @@
       </p:sp>
       <p:sp>
         <p:nvSpPr>
-          <p:cNvPr id="354" name="Google Shape;354;p26"/>
+          <p:cNvPr id="356" name="Google Shape;356;p26"/>
           <p:cNvSpPr/>
           <p:nvPr/>
         </p:nvSpPr>
@@ -17317,7 +17318,7 @@
       </p:sp>
       <p:sp>
         <p:nvSpPr>
-          <p:cNvPr id="355" name="Google Shape;355;p26"/>
+          <p:cNvPr id="357" name="Google Shape;357;p26"/>
           <p:cNvSpPr/>
           <p:nvPr/>
         </p:nvSpPr>
@@ -17366,7 +17367,7 @@
       </p:sp>
       <p:sp>
         <p:nvSpPr>
-          <p:cNvPr id="356" name="Google Shape;356;p26"/>
+          <p:cNvPr id="358" name="Google Shape;358;p26"/>
           <p:cNvSpPr/>
           <p:nvPr/>
         </p:nvSpPr>
@@ -17416,7 +17417,7 @@
       </p:sp>
       <p:cxnSp>
         <p:nvCxnSpPr>
-          <p:cNvPr id="357" name="Google Shape;357;p26"/>
+          <p:cNvPr id="359" name="Google Shape;359;p26"/>
           <p:cNvCxnSpPr/>
           <p:nvPr/>
         </p:nvCxnSpPr>
@@ -17442,7 +17443,7 @@
       </p:cxnSp>
       <p:sp>
         <p:nvSpPr>
-          <p:cNvPr id="358" name="Google Shape;358;p26"/>
+          <p:cNvPr id="360" name="Google Shape;360;p26"/>
           <p:cNvSpPr txBox="1"/>
           <p:nvPr/>
         </p:nvSpPr>
@@ -17527,7 +17528,7 @@
   <p:cSld>
     <p:spTree>
       <p:nvGrpSpPr>
-        <p:cNvPr id="362" name="Shape 362"/>
+        <p:cNvPr id="364" name="Shape 364"/>
         <p:cNvGrpSpPr/>
         <p:nvPr/>
       </p:nvGrpSpPr>
@@ -17541,7 +17542,7 @@
       </p:grpSpPr>
       <p:sp>
         <p:nvSpPr>
-          <p:cNvPr id="363" name="Google Shape;363;p27"/>
+          <p:cNvPr id="365" name="Google Shape;365;p27"/>
           <p:cNvSpPr txBox="1"/>
           <p:nvPr>
             <p:ph type="title"/>
@@ -17581,7 +17582,7 @@
       </p:sp>
       <p:sp>
         <p:nvSpPr>
-          <p:cNvPr id="364" name="Google Shape;364;p27"/>
+          <p:cNvPr id="366" name="Google Shape;366;p27"/>
           <p:cNvSpPr txBox="1"/>
           <p:nvPr>
             <p:ph idx="1" type="body"/>
@@ -17671,7 +17672,7 @@
       </p:sp>
       <p:pic>
         <p:nvPicPr>
-          <p:cNvPr id="365" name="Google Shape;365;p27"/>
+          <p:cNvPr id="367" name="Google Shape;367;p27"/>
           <p:cNvPicPr preferRelativeResize="0"/>
           <p:nvPr/>
         </p:nvPicPr>
@@ -17699,7 +17700,7 @@
       </p:pic>
       <p:pic>
         <p:nvPicPr>
-          <p:cNvPr id="366" name="Google Shape;366;p27"/>
+          <p:cNvPr id="368" name="Google Shape;368;p27"/>
           <p:cNvPicPr preferRelativeResize="0"/>
           <p:nvPr/>
         </p:nvPicPr>
@@ -17727,7 +17728,7 @@
       </p:pic>
       <p:sp>
         <p:nvSpPr>
-          <p:cNvPr id="367" name="Google Shape;367;p27"/>
+          <p:cNvPr id="369" name="Google Shape;369;p27"/>
           <p:cNvSpPr txBox="1"/>
           <p:nvPr/>
         </p:nvSpPr>
@@ -17810,7 +17811,7 @@
   <p:cSld>
     <p:spTree>
       <p:nvGrpSpPr>
-        <p:cNvPr id="371" name="Shape 371"/>
+        <p:cNvPr id="373" name="Shape 373"/>
         <p:cNvGrpSpPr/>
         <p:nvPr/>
       </p:nvGrpSpPr>
@@ -17824,7 +17825,7 @@
       </p:grpSpPr>
       <p:sp>
         <p:nvSpPr>
-          <p:cNvPr id="372" name="Google Shape;372;p28"/>
+          <p:cNvPr id="374" name="Google Shape;374;p28"/>
           <p:cNvSpPr txBox="1"/>
           <p:nvPr>
             <p:ph type="title"/>
@@ -17868,7 +17869,7 @@
       </p:sp>
       <p:pic>
         <p:nvPicPr>
-          <p:cNvPr id="373" name="Google Shape;373;p28"/>
+          <p:cNvPr id="375" name="Google Shape;375;p28"/>
           <p:cNvPicPr preferRelativeResize="0"/>
           <p:nvPr/>
         </p:nvPicPr>
@@ -17907,7 +17908,7 @@
   <p:cSld>
     <p:spTree>
       <p:nvGrpSpPr>
-        <p:cNvPr id="377" name="Shape 377"/>
+        <p:cNvPr id="379" name="Shape 379"/>
         <p:cNvGrpSpPr/>
         <p:nvPr/>
       </p:nvGrpSpPr>
@@ -17921,7 +17922,7 @@
       </p:grpSpPr>
       <p:sp>
         <p:nvSpPr>
-          <p:cNvPr id="378" name="Google Shape;378;p29"/>
+          <p:cNvPr id="380" name="Google Shape;380;p29"/>
           <p:cNvSpPr txBox="1"/>
           <p:nvPr>
             <p:ph type="title"/>
@@ -17981,7 +17982,7 @@
       </p:sp>
       <p:pic>
         <p:nvPicPr>
-          <p:cNvPr id="379" name="Google Shape;379;p29"/>
+          <p:cNvPr id="381" name="Google Shape;381;p29"/>
           <p:cNvPicPr preferRelativeResize="0"/>
           <p:nvPr/>
         </p:nvPicPr>
@@ -18009,7 +18010,7 @@
       </p:pic>
       <p:pic>
         <p:nvPicPr>
-          <p:cNvPr id="380" name="Google Shape;380;p29"/>
+          <p:cNvPr id="382" name="Google Shape;382;p29"/>
           <p:cNvPicPr preferRelativeResize="0"/>
           <p:nvPr/>
         </p:nvPicPr>
@@ -18047,7 +18048,7 @@
   <p:cSld>
     <p:spTree>
       <p:nvGrpSpPr>
-        <p:cNvPr id="384" name="Shape 384"/>
+        <p:cNvPr id="386" name="Shape 386"/>
         <p:cNvGrpSpPr/>
         <p:nvPr/>
       </p:nvGrpSpPr>
@@ -18061,7 +18062,7 @@
       </p:grpSpPr>
       <p:sp>
         <p:nvSpPr>
-          <p:cNvPr id="385" name="Google Shape;385;p30"/>
+          <p:cNvPr id="387" name="Google Shape;387;p30"/>
           <p:cNvSpPr txBox="1"/>
           <p:nvPr>
             <p:ph type="title"/>
@@ -18116,7 +18117,7 @@
       </p:sp>
       <p:pic>
         <p:nvPicPr>
-          <p:cNvPr id="386" name="Google Shape;386;p30"/>
+          <p:cNvPr id="388" name="Google Shape;388;p30"/>
           <p:cNvPicPr preferRelativeResize="0"/>
           <p:nvPr/>
         </p:nvPicPr>
@@ -18144,7 +18145,7 @@
       </p:pic>
       <p:pic>
         <p:nvPicPr>
-          <p:cNvPr id="387" name="Google Shape;387;p30"/>
+          <p:cNvPr id="389" name="Google Shape;389;p30"/>
           <p:cNvPicPr preferRelativeResize="0"/>
           <p:nvPr/>
         </p:nvPicPr>
@@ -18171,7 +18172,7 @@
       </p:pic>
       <p:pic>
         <p:nvPicPr>
-          <p:cNvPr id="388" name="Google Shape;388;p30"/>
+          <p:cNvPr id="390" name="Google Shape;390;p30"/>
           <p:cNvPicPr preferRelativeResize="0"/>
           <p:nvPr/>
         </p:nvPicPr>
@@ -18373,7 +18374,7 @@
             <a:tbl>
               <a:tblPr>
                 <a:noFill/>
-                <a:tableStyleId>{7EBA7BD5-8FFA-4A5E-B0AB-F76BCCF69CEA}</a:tableStyleId>
+                <a:tableStyleId>{0AB64E7D-FE4F-4541-8213-99132243926A}</a:tableStyleId>
               </a:tblPr>
               <a:tblGrid>
                 <a:gridCol w="653925"/>
@@ -19170,7 +19171,7 @@
                       </a:pPr>
                       <a:r>
                         <a:rPr lang="en" sz="1200"/>
-                        <a:t>IPv4 IPv6</a:t>
+                        <a:t>IPv4/IPv6</a:t>
                       </a:r>
                       <a:endParaRPr sz="1200"/>
                     </a:p>
@@ -19935,7 +19936,15 @@
             </a:pPr>
             <a:r>
               <a:rPr lang="en"/>
-              <a:t>Sending a message from A to B to C to D to … to Z</a:t>
+              <a:t>Sending a message from A ⇒ Z  by going through B to C to D to … to Y and then </a:t>
+            </a:r>
+            <a:r>
+              <a:rPr lang="en"/>
+              <a:t>finally</a:t>
+            </a:r>
+            <a:r>
+              <a:rPr lang="en"/>
+              <a:t> Z</a:t>
             </a:r>
             <a:endParaRPr/>
           </a:p>
@@ -20050,7 +20059,7 @@
             </a:pPr>
             <a:r>
               <a:rPr lang="en"/>
-              <a:t>IPv4 Packet</a:t>
+              <a:t>IPv4 Packet Header</a:t>
             </a:r>
             <a:endParaRPr/>
           </a:p>
@@ -20163,7 +20172,7 @@
             <a:tbl>
               <a:tblPr>
                 <a:noFill/>
-                <a:tableStyleId>{7EBA7BD5-8FFA-4A5E-B0AB-F76BCCF69CEA}</a:tableStyleId>
+                <a:tableStyleId>{0AB64E7D-FE4F-4541-8213-99132243926A}</a:tableStyleId>
               </a:tblPr>
               <a:tblGrid>
                 <a:gridCol w="1661975"/>
@@ -20257,10 +20266,10 @@
                         <a:buNone/>
                       </a:pPr>
                       <a:r>
-                        <a:rPr lang="en"/>
+                        <a:rPr i="1" lang="en"/>
                         <a:t>N</a:t>
                       </a:r>
-                      <a:endParaRPr/>
+                      <a:endParaRPr i="1"/>
                     </a:p>
                   </a:txBody>
                   <a:tcPr marT="91425" marB="91425" marR="91425" marL="91425"/>
@@ -21379,7 +21388,7 @@
             <a:tbl>
               <a:tblPr>
                 <a:noFill/>
-                <a:tableStyleId>{7EBA7BD5-8FFA-4A5E-B0AB-F76BCCF69CEA}</a:tableStyleId>
+                <a:tableStyleId>{0AB64E7D-FE4F-4541-8213-99132243926A}</a:tableStyleId>
               </a:tblPr>
               <a:tblGrid>
                 <a:gridCol w="2413000"/>
@@ -21646,7 +21655,17 @@
                       <a:endParaRPr/>
                     </a:p>
                   </a:txBody>
-                  <a:tcPr marT="91425" marB="91425" marR="91425" marL="91425"/>
+                  <a:tcPr marT="91425" marB="91425" marR="91425" marL="91425">
+                    <a:lnB cap="flat" cmpd="sng" w="76200">
+                      <a:solidFill>
+                        <a:srgbClr val="9E9E9E"/>
+                      </a:solidFill>
+                      <a:prstDash val="solid"/>
+                      <a:round/>
+                      <a:headEnd len="sm" w="sm" type="none"/>
+                      <a:tailEnd len="sm" w="sm" type="none"/>
+                    </a:lnB>
+                  </a:tcPr>
                 </a:tc>
                 <a:tc>
                   <a:txBody>
@@ -21669,7 +21688,17 @@
                       <a:endParaRPr/>
                     </a:p>
                   </a:txBody>
-                  <a:tcPr marT="91425" marB="91425" marR="91425" marL="91425"/>
+                  <a:tcPr marT="91425" marB="91425" marR="91425" marL="91425">
+                    <a:lnB cap="flat" cmpd="sng" w="76200">
+                      <a:solidFill>
+                        <a:srgbClr val="9E9E9E"/>
+                      </a:solidFill>
+                      <a:prstDash val="solid"/>
+                      <a:round/>
+                      <a:headEnd len="sm" w="sm" type="none"/>
+                      <a:tailEnd len="sm" w="sm" type="none"/>
+                    </a:lnB>
+                  </a:tcPr>
                 </a:tc>
                 <a:tc>
                   <a:txBody>
@@ -21700,7 +21729,17 @@
                       <a:endParaRPr/>
                     </a:p>
                   </a:txBody>
-                  <a:tcPr marT="91425" marB="91425" marR="91425" marL="91425"/>
+                  <a:tcPr marT="91425" marB="91425" marR="91425" marL="91425">
+                    <a:lnB cap="flat" cmpd="sng" w="76200">
+                      <a:solidFill>
+                        <a:srgbClr val="9E9E9E"/>
+                      </a:solidFill>
+                      <a:prstDash val="solid"/>
+                      <a:round/>
+                      <a:headEnd len="sm" w="sm" type="none"/>
+                      <a:tailEnd len="sm" w="sm" type="none"/>
+                    </a:lnB>
+                  </a:tcPr>
                 </a:tc>
               </a:tr>
               <a:tr h="381000">
@@ -21725,7 +21764,17 @@
                       <a:endParaRPr/>
                     </a:p>
                   </a:txBody>
-                  <a:tcPr marT="91425" marB="91425" marR="91425" marL="91425"/>
+                  <a:tcPr marT="91425" marB="91425" marR="91425" marL="91425">
+                    <a:lnT cap="flat" cmpd="sng" w="76200">
+                      <a:solidFill>
+                        <a:srgbClr val="9E9E9E"/>
+                      </a:solidFill>
+                      <a:prstDash val="solid"/>
+                      <a:round/>
+                      <a:headEnd len="sm" w="sm" type="none"/>
+                      <a:tailEnd len="sm" w="sm" type="none"/>
+                    </a:lnT>
+                  </a:tcPr>
                 </a:tc>
                 <a:tc>
                   <a:txBody>
@@ -21747,7 +21796,17 @@
                       <a:endParaRPr/>
                     </a:p>
                   </a:txBody>
-                  <a:tcPr marT="91425" marB="91425" marR="91425" marL="91425"/>
+                  <a:tcPr marT="91425" marB="91425" marR="91425" marL="91425">
+                    <a:lnT cap="flat" cmpd="sng" w="76200">
+                      <a:solidFill>
+                        <a:srgbClr val="9E9E9E"/>
+                      </a:solidFill>
+                      <a:prstDash val="solid"/>
+                      <a:round/>
+                      <a:headEnd len="sm" w="sm" type="none"/>
+                      <a:tailEnd len="sm" w="sm" type="none"/>
+                    </a:lnT>
+                  </a:tcPr>
                 </a:tc>
                 <a:tc>
                   <a:txBody>
@@ -21769,7 +21828,17 @@
                       <a:endParaRPr/>
                     </a:p>
                   </a:txBody>
-                  <a:tcPr marT="91425" marB="91425" marR="91425" marL="91425"/>
+                  <a:tcPr marT="91425" marB="91425" marR="91425" marL="91425">
+                    <a:lnT cap="flat" cmpd="sng" w="76200">
+                      <a:solidFill>
+                        <a:srgbClr val="9E9E9E"/>
+                      </a:solidFill>
+                      <a:prstDash val="solid"/>
+                      <a:round/>
+                      <a:headEnd len="sm" w="sm" type="none"/>
+                      <a:tailEnd len="sm" w="sm" type="none"/>
+                    </a:lnT>
+                  </a:tcPr>
                 </a:tc>
               </a:tr>
               <a:tr h="381000">
@@ -22254,6 +22323,536 @@
           </a:ln>
         </p:spPr>
       </p:pic>
+      <p:graphicFrame>
+        <p:nvGraphicFramePr>
+          <p:cNvPr id="109" name="Google Shape;109;p20"/>
+          <p:cNvGraphicFramePr/>
+          <p:nvPr/>
+        </p:nvGraphicFramePr>
+        <p:xfrm>
+          <a:off x="6512225" y="244200"/>
+          <a:ext cx="3000000" cy="3000000"/>
+        </p:xfrm>
+        <a:graphic>
+          <a:graphicData uri="http://schemas.openxmlformats.org/drawingml/2006/table">
+            <a:tbl>
+              <a:tblPr>
+                <a:noFill/>
+                <a:tableStyleId>{0AB64E7D-FE4F-4541-8213-99132243926A}</a:tableStyleId>
+              </a:tblPr>
+              <a:tblGrid>
+                <a:gridCol w="813700"/>
+                <a:gridCol w="813700"/>
+                <a:gridCol w="813700"/>
+              </a:tblGrid>
+              <a:tr h="343625">
+                <a:tc>
+                  <a:txBody>
+                    <a:bodyPr/>
+                    <a:lstStyle/>
+                    <a:p>
+                      <a:pPr indent="0" lvl="0" marL="0" rtl="0" algn="ctr">
+                        <a:spcBef>
+                          <a:spcPts val="0"/>
+                        </a:spcBef>
+                        <a:spcAft>
+                          <a:spcPts val="0"/>
+                        </a:spcAft>
+                        <a:buNone/>
+                      </a:pPr>
+                      <a:r>
+                        <a:rPr lang="en"/>
+                        <a:t>A</a:t>
+                      </a:r>
+                      <a:endParaRPr/>
+                    </a:p>
+                  </a:txBody>
+                  <a:tcPr marT="91425" marB="91425" marR="91425" marL="91425"/>
+                </a:tc>
+                <a:tc>
+                  <a:txBody>
+                    <a:bodyPr/>
+                    <a:lstStyle/>
+                    <a:p>
+                      <a:pPr indent="0" lvl="0" marL="0" rtl="0" algn="ctr">
+                        <a:spcBef>
+                          <a:spcPts val="0"/>
+                        </a:spcBef>
+                        <a:spcAft>
+                          <a:spcPts val="0"/>
+                        </a:spcAft>
+                        <a:buNone/>
+                      </a:pPr>
+                      <a:r>
+                        <a:rPr lang="en"/>
+                        <a:t>B</a:t>
+                      </a:r>
+                      <a:endParaRPr/>
+                    </a:p>
+                  </a:txBody>
+                  <a:tcPr marT="91425" marB="91425" marR="91425" marL="91425">
+                    <a:lnR cap="flat" cmpd="sng" w="76200">
+                      <a:solidFill>
+                        <a:srgbClr val="9E9E9E"/>
+                      </a:solidFill>
+                      <a:prstDash val="solid"/>
+                      <a:round/>
+                      <a:headEnd len="sm" w="sm" type="none"/>
+                      <a:tailEnd len="sm" w="sm" type="none"/>
+                    </a:lnR>
+                  </a:tcPr>
+                </a:tc>
+                <a:tc>
+                  <a:txBody>
+                    <a:bodyPr/>
+                    <a:lstStyle/>
+                    <a:p>
+                      <a:pPr indent="0" lvl="0" marL="0" rtl="0" algn="ctr">
+                        <a:spcBef>
+                          <a:spcPts val="0"/>
+                        </a:spcBef>
+                        <a:spcAft>
+                          <a:spcPts val="0"/>
+                        </a:spcAft>
+                        <a:buNone/>
+                      </a:pPr>
+                      <a:r>
+                        <a:rPr lang="en" sz="1050">
+                          <a:solidFill>
+                            <a:schemeClr val="dk2"/>
+                          </a:solidFill>
+                          <a:highlight>
+                            <a:schemeClr val="lt1"/>
+                          </a:highlight>
+                        </a:rPr>
+                        <a:t>⊕ </a:t>
+                      </a:r>
+                      <a:endParaRPr/>
+                    </a:p>
+                  </a:txBody>
+                  <a:tcPr marT="91425" marB="91425" marR="91425" marL="91425">
+                    <a:lnL cap="flat" cmpd="sng" w="76200">
+                      <a:solidFill>
+                        <a:srgbClr val="9E9E9E"/>
+                      </a:solidFill>
+                      <a:prstDash val="solid"/>
+                      <a:round/>
+                      <a:headEnd len="sm" w="sm" type="none"/>
+                      <a:tailEnd len="sm" w="sm" type="none"/>
+                    </a:lnL>
+                  </a:tcPr>
+                </a:tc>
+              </a:tr>
+              <a:tr h="312775">
+                <a:tc>
+                  <a:txBody>
+                    <a:bodyPr/>
+                    <a:lstStyle/>
+                    <a:p>
+                      <a:pPr indent="0" lvl="0" marL="0" rtl="0" algn="ctr">
+                        <a:spcBef>
+                          <a:spcPts val="0"/>
+                        </a:spcBef>
+                        <a:spcAft>
+                          <a:spcPts val="0"/>
+                        </a:spcAft>
+                        <a:buNone/>
+                      </a:pPr>
+                      <a:r>
+                        <a:rPr lang="en"/>
+                        <a:t>False</a:t>
+                      </a:r>
+                      <a:endParaRPr/>
+                    </a:p>
+                  </a:txBody>
+                  <a:tcPr marT="91425" marB="91425" marR="91425" marL="91425"/>
+                </a:tc>
+                <a:tc>
+                  <a:txBody>
+                    <a:bodyPr/>
+                    <a:lstStyle/>
+                    <a:p>
+                      <a:pPr indent="0" lvl="0" marL="0" rtl="0" algn="ctr">
+                        <a:spcBef>
+                          <a:spcPts val="0"/>
+                        </a:spcBef>
+                        <a:spcAft>
+                          <a:spcPts val="0"/>
+                        </a:spcAft>
+                        <a:buNone/>
+                      </a:pPr>
+                      <a:r>
+                        <a:rPr lang="en"/>
+                        <a:t>False</a:t>
+                      </a:r>
+                      <a:endParaRPr/>
+                    </a:p>
+                  </a:txBody>
+                  <a:tcPr marT="91425" marB="91425" marR="91425" marL="91425">
+                    <a:lnR cap="flat" cmpd="sng" w="76200">
+                      <a:solidFill>
+                        <a:srgbClr val="9E9E9E"/>
+                      </a:solidFill>
+                      <a:prstDash val="solid"/>
+                      <a:round/>
+                      <a:headEnd len="sm" w="sm" type="none"/>
+                      <a:tailEnd len="sm" w="sm" type="none"/>
+                    </a:lnR>
+                  </a:tcPr>
+                </a:tc>
+                <a:tc>
+                  <a:txBody>
+                    <a:bodyPr/>
+                    <a:lstStyle/>
+                    <a:p>
+                      <a:pPr indent="0" lvl="0" marL="0" rtl="0" algn="ctr">
+                        <a:spcBef>
+                          <a:spcPts val="0"/>
+                        </a:spcBef>
+                        <a:spcAft>
+                          <a:spcPts val="0"/>
+                        </a:spcAft>
+                        <a:buNone/>
+                      </a:pPr>
+                      <a:r>
+                        <a:rPr lang="en"/>
+                        <a:t>False</a:t>
+                      </a:r>
+                      <a:endParaRPr/>
+                    </a:p>
+                  </a:txBody>
+                  <a:tcPr marT="91425" marB="91425" marR="91425" marL="91425">
+                    <a:lnL cap="flat" cmpd="sng" w="76200">
+                      <a:solidFill>
+                        <a:srgbClr val="9E9E9E"/>
+                      </a:solidFill>
+                      <a:prstDash val="solid"/>
+                      <a:round/>
+                      <a:headEnd len="sm" w="sm" type="none"/>
+                      <a:tailEnd len="sm" w="sm" type="none"/>
+                    </a:lnL>
+                  </a:tcPr>
+                </a:tc>
+              </a:tr>
+              <a:tr h="312775">
+                <a:tc>
+                  <a:txBody>
+                    <a:bodyPr/>
+                    <a:lstStyle/>
+                    <a:p>
+                      <a:pPr indent="0" lvl="0" marL="0" rtl="0" algn="ctr">
+                        <a:spcBef>
+                          <a:spcPts val="0"/>
+                        </a:spcBef>
+                        <a:spcAft>
+                          <a:spcPts val="0"/>
+                        </a:spcAft>
+                        <a:buNone/>
+                      </a:pPr>
+                      <a:r>
+                        <a:rPr lang="en"/>
+                        <a:t>False</a:t>
+                      </a:r>
+                      <a:endParaRPr/>
+                    </a:p>
+                  </a:txBody>
+                  <a:tcPr marT="91425" marB="91425" marR="91425" marL="91425"/>
+                </a:tc>
+                <a:tc>
+                  <a:txBody>
+                    <a:bodyPr/>
+                    <a:lstStyle/>
+                    <a:p>
+                      <a:pPr indent="0" lvl="0" marL="0" rtl="0" algn="ctr">
+                        <a:spcBef>
+                          <a:spcPts val="0"/>
+                        </a:spcBef>
+                        <a:spcAft>
+                          <a:spcPts val="0"/>
+                        </a:spcAft>
+                        <a:buNone/>
+                      </a:pPr>
+                      <a:r>
+                        <a:rPr lang="en"/>
+                        <a:t>True</a:t>
+                      </a:r>
+                      <a:endParaRPr/>
+                    </a:p>
+                  </a:txBody>
+                  <a:tcPr marT="91425" marB="91425" marR="91425" marL="91425">
+                    <a:lnR cap="flat" cmpd="sng" w="76200">
+                      <a:solidFill>
+                        <a:srgbClr val="9E9E9E"/>
+                      </a:solidFill>
+                      <a:prstDash val="solid"/>
+                      <a:round/>
+                      <a:headEnd len="sm" w="sm" type="none"/>
+                      <a:tailEnd len="sm" w="sm" type="none"/>
+                    </a:lnR>
+                  </a:tcPr>
+                </a:tc>
+                <a:tc>
+                  <a:txBody>
+                    <a:bodyPr/>
+                    <a:lstStyle/>
+                    <a:p>
+                      <a:pPr indent="0" lvl="0" marL="0" rtl="0" algn="ctr">
+                        <a:spcBef>
+                          <a:spcPts val="0"/>
+                        </a:spcBef>
+                        <a:spcAft>
+                          <a:spcPts val="0"/>
+                        </a:spcAft>
+                        <a:buNone/>
+                      </a:pPr>
+                      <a:r>
+                        <a:rPr lang="en"/>
+                        <a:t>True</a:t>
+                      </a:r>
+                      <a:endParaRPr/>
+                    </a:p>
+                  </a:txBody>
+                  <a:tcPr marT="91425" marB="91425" marR="91425" marL="91425">
+                    <a:lnL cap="flat" cmpd="sng" w="76200">
+                      <a:solidFill>
+                        <a:srgbClr val="9E9E9E"/>
+                      </a:solidFill>
+                      <a:prstDash val="solid"/>
+                      <a:round/>
+                      <a:headEnd len="sm" w="sm" type="none"/>
+                      <a:tailEnd len="sm" w="sm" type="none"/>
+                    </a:lnL>
+                  </a:tcPr>
+                </a:tc>
+              </a:tr>
+              <a:tr h="312775">
+                <a:tc>
+                  <a:txBody>
+                    <a:bodyPr/>
+                    <a:lstStyle/>
+                    <a:p>
+                      <a:pPr indent="0" lvl="0" marL="0" rtl="0" algn="ctr">
+                        <a:spcBef>
+                          <a:spcPts val="0"/>
+                        </a:spcBef>
+                        <a:spcAft>
+                          <a:spcPts val="0"/>
+                        </a:spcAft>
+                        <a:buNone/>
+                      </a:pPr>
+                      <a:r>
+                        <a:rPr lang="en"/>
+                        <a:t>True</a:t>
+                      </a:r>
+                      <a:endParaRPr/>
+                    </a:p>
+                  </a:txBody>
+                  <a:tcPr marT="91425" marB="91425" marR="91425" marL="91425"/>
+                </a:tc>
+                <a:tc>
+                  <a:txBody>
+                    <a:bodyPr/>
+                    <a:lstStyle/>
+                    <a:p>
+                      <a:pPr indent="0" lvl="0" marL="0" rtl="0" algn="ctr">
+                        <a:spcBef>
+                          <a:spcPts val="0"/>
+                        </a:spcBef>
+                        <a:spcAft>
+                          <a:spcPts val="0"/>
+                        </a:spcAft>
+                        <a:buNone/>
+                      </a:pPr>
+                      <a:r>
+                        <a:rPr lang="en"/>
+                        <a:t>False</a:t>
+                      </a:r>
+                      <a:endParaRPr/>
+                    </a:p>
+                  </a:txBody>
+                  <a:tcPr marT="91425" marB="91425" marR="91425" marL="91425">
+                    <a:lnR cap="flat" cmpd="sng" w="76200">
+                      <a:solidFill>
+                        <a:srgbClr val="9E9E9E"/>
+                      </a:solidFill>
+                      <a:prstDash val="solid"/>
+                      <a:round/>
+                      <a:headEnd len="sm" w="sm" type="none"/>
+                      <a:tailEnd len="sm" w="sm" type="none"/>
+                    </a:lnR>
+                  </a:tcPr>
+                </a:tc>
+                <a:tc>
+                  <a:txBody>
+                    <a:bodyPr/>
+                    <a:lstStyle/>
+                    <a:p>
+                      <a:pPr indent="0" lvl="0" marL="0" rtl="0" algn="ctr">
+                        <a:spcBef>
+                          <a:spcPts val="0"/>
+                        </a:spcBef>
+                        <a:spcAft>
+                          <a:spcPts val="0"/>
+                        </a:spcAft>
+                        <a:buNone/>
+                      </a:pPr>
+                      <a:r>
+                        <a:rPr lang="en"/>
+                        <a:t>True</a:t>
+                      </a:r>
+                      <a:endParaRPr/>
+                    </a:p>
+                  </a:txBody>
+                  <a:tcPr marT="91425" marB="91425" marR="91425" marL="91425">
+                    <a:lnL cap="flat" cmpd="sng" w="76200">
+                      <a:solidFill>
+                        <a:srgbClr val="9E9E9E"/>
+                      </a:solidFill>
+                      <a:prstDash val="solid"/>
+                      <a:round/>
+                      <a:headEnd len="sm" w="sm" type="none"/>
+                      <a:tailEnd len="sm" w="sm" type="none"/>
+                    </a:lnL>
+                  </a:tcPr>
+                </a:tc>
+              </a:tr>
+              <a:tr h="312775">
+                <a:tc>
+                  <a:txBody>
+                    <a:bodyPr/>
+                    <a:lstStyle/>
+                    <a:p>
+                      <a:pPr indent="0" lvl="0" marL="0" rtl="0" algn="ctr">
+                        <a:spcBef>
+                          <a:spcPts val="0"/>
+                        </a:spcBef>
+                        <a:spcAft>
+                          <a:spcPts val="0"/>
+                        </a:spcAft>
+                        <a:buNone/>
+                      </a:pPr>
+                      <a:r>
+                        <a:rPr lang="en"/>
+                        <a:t>True</a:t>
+                      </a:r>
+                      <a:endParaRPr/>
+                    </a:p>
+                  </a:txBody>
+                  <a:tcPr marT="91425" marB="91425" marR="91425" marL="91425"/>
+                </a:tc>
+                <a:tc>
+                  <a:txBody>
+                    <a:bodyPr/>
+                    <a:lstStyle/>
+                    <a:p>
+                      <a:pPr indent="0" lvl="0" marL="0" rtl="0" algn="ctr">
+                        <a:spcBef>
+                          <a:spcPts val="0"/>
+                        </a:spcBef>
+                        <a:spcAft>
+                          <a:spcPts val="0"/>
+                        </a:spcAft>
+                        <a:buNone/>
+                      </a:pPr>
+                      <a:r>
+                        <a:rPr lang="en"/>
+                        <a:t>True</a:t>
+                      </a:r>
+                      <a:endParaRPr/>
+                    </a:p>
+                  </a:txBody>
+                  <a:tcPr marT="91425" marB="91425" marR="91425" marL="91425">
+                    <a:lnR cap="flat" cmpd="sng" w="76200">
+                      <a:solidFill>
+                        <a:srgbClr val="9E9E9E"/>
+                      </a:solidFill>
+                      <a:prstDash val="solid"/>
+                      <a:round/>
+                      <a:headEnd len="sm" w="sm" type="none"/>
+                      <a:tailEnd len="sm" w="sm" type="none"/>
+                    </a:lnR>
+                  </a:tcPr>
+                </a:tc>
+                <a:tc>
+                  <a:txBody>
+                    <a:bodyPr/>
+                    <a:lstStyle/>
+                    <a:p>
+                      <a:pPr indent="0" lvl="0" marL="0" rtl="0" algn="ctr">
+                        <a:spcBef>
+                          <a:spcPts val="0"/>
+                        </a:spcBef>
+                        <a:spcAft>
+                          <a:spcPts val="0"/>
+                        </a:spcAft>
+                        <a:buNone/>
+                      </a:pPr>
+                      <a:r>
+                        <a:rPr lang="en"/>
+                        <a:t>False</a:t>
+                      </a:r>
+                      <a:endParaRPr/>
+                    </a:p>
+                  </a:txBody>
+                  <a:tcPr marT="91425" marB="91425" marR="91425" marL="91425">
+                    <a:lnL cap="flat" cmpd="sng" w="76200">
+                      <a:solidFill>
+                        <a:srgbClr val="9E9E9E"/>
+                      </a:solidFill>
+                      <a:prstDash val="solid"/>
+                      <a:round/>
+                      <a:headEnd len="sm" w="sm" type="none"/>
+                      <a:tailEnd len="sm" w="sm" type="none"/>
+                    </a:lnL>
+                  </a:tcPr>
+                </a:tc>
+              </a:tr>
+            </a:tbl>
+          </a:graphicData>
+        </a:graphic>
+      </p:graphicFrame>
+      <p:sp>
+        <p:nvSpPr>
+          <p:cNvPr id="110" name="Google Shape;110;p20"/>
+          <p:cNvSpPr txBox="1"/>
+          <p:nvPr/>
+        </p:nvSpPr>
+        <p:spPr>
+          <a:xfrm>
+            <a:off x="3821650" y="304850"/>
+            <a:ext cx="1587600" cy="400200"/>
+          </a:xfrm>
+          <a:prstGeom prst="rect">
+            <a:avLst/>
+          </a:prstGeom>
+          <a:noFill/>
+          <a:ln>
+            <a:noFill/>
+          </a:ln>
+        </p:spPr>
+        <p:txBody>
+          <a:bodyPr anchorCtr="0" anchor="t" bIns="91425" lIns="91425" spcFirstLastPara="1" rIns="91425" wrap="square" tIns="91425">
+            <a:spAutoFit/>
+          </a:bodyPr>
+          <a:lstStyle/>
+          <a:p>
+            <a:pPr indent="0" lvl="0" marL="0" rtl="0" algn="l">
+              <a:spcBef>
+                <a:spcPts val="0"/>
+              </a:spcBef>
+              <a:spcAft>
+                <a:spcPts val="0"/>
+              </a:spcAft>
+              <a:buNone/>
+            </a:pPr>
+            <a:r>
+              <a:rPr lang="en"/>
+              <a:t>java:  A || B</a:t>
+            </a:r>
+            <a:endParaRPr/>
+          </a:p>
+        </p:txBody>
+      </p:sp>
     </p:spTree>
   </p:cSld>
   <p:clrMapOvr>
@@ -22267,7 +22866,7 @@
   <p:cSld>
     <p:spTree>
       <p:nvGrpSpPr>
-        <p:cNvPr id="112" name="Shape 112"/>
+        <p:cNvPr id="114" name="Shape 114"/>
         <p:cNvGrpSpPr/>
         <p:nvPr/>
       </p:nvGrpSpPr>
@@ -22281,7 +22880,7 @@
       </p:grpSpPr>
       <p:sp>
         <p:nvSpPr>
-          <p:cNvPr id="113" name="Google Shape;113;p21"/>
+          <p:cNvPr id="115" name="Google Shape;115;p21"/>
           <p:cNvSpPr txBox="1"/>
           <p:nvPr>
             <p:ph type="title"/>
@@ -22321,7 +22920,7 @@
       </p:sp>
       <p:sp>
         <p:nvSpPr>
-          <p:cNvPr id="114" name="Google Shape;114;p21"/>
+          <p:cNvPr id="116" name="Google Shape;116;p21"/>
           <p:cNvSpPr txBox="1"/>
           <p:nvPr>
             <p:ph idx="1" type="body"/>
@@ -22429,7 +23028,7 @@
       </p:sp>
       <p:pic>
         <p:nvPicPr>
-          <p:cNvPr id="115" name="Google Shape;115;p21"/>
+          <p:cNvPr id="117" name="Google Shape;117;p21"/>
           <p:cNvPicPr preferRelativeResize="0"/>
           <p:nvPr/>
         </p:nvPicPr>
@@ -22457,12 +23056,12 @@
       </p:pic>
       <p:graphicFrame>
         <p:nvGraphicFramePr>
-          <p:cNvPr id="116" name="Google Shape;116;p21"/>
+          <p:cNvPr id="118" name="Google Shape;118;p21"/>
           <p:cNvGraphicFramePr/>
           <p:nvPr/>
         </p:nvGraphicFramePr>
         <p:xfrm>
-          <a:off x="1059550" y="2498800"/>
+          <a:off x="1022375" y="2498800"/>
           <a:ext cx="3000000" cy="3000000"/>
         </p:xfrm>
         <a:graphic>
@@ -22470,10 +23069,10 @@
             <a:tbl>
               <a:tblPr>
                 <a:noFill/>
-                <a:tableStyleId>{7EBA7BD5-8FFA-4A5E-B0AB-F76BCCF69CEA}</a:tableStyleId>
+                <a:tableStyleId>{0AB64E7D-FE4F-4541-8213-99132243926A}</a:tableStyleId>
               </a:tblPr>
               <a:tblGrid>
-                <a:gridCol w="382850"/>
+                <a:gridCol w="420025"/>
                 <a:gridCol w="382850"/>
                 <a:gridCol w="382850"/>
                 <a:gridCol w="889725"/>
@@ -23177,6 +23776,285 @@
 </file>
 
 <file path=ppt/theme/theme1.xml><?xml version="1.0" encoding="utf-8"?>
+<a:theme xmlns:a="http://schemas.openxmlformats.org/drawingml/2006/main" xmlns:r="http://schemas.openxmlformats.org/officeDocument/2006/relationships">
+  <a:themeElements>
+    <a:clrScheme name="Default">
+      <a:dk1>
+        <a:srgbClr val="000000"/>
+      </a:dk1>
+      <a:lt1>
+        <a:srgbClr val="FFFFFF"/>
+      </a:lt1>
+      <a:dk2>
+        <a:srgbClr val="158158"/>
+      </a:dk2>
+      <a:lt2>
+        <a:srgbClr val="F3F3F3"/>
+      </a:lt2>
+      <a:accent1>
+        <a:srgbClr val="058DC7"/>
+      </a:accent1>
+      <a:accent2>
+        <a:srgbClr val="50B432"/>
+      </a:accent2>
+      <a:accent3>
+        <a:srgbClr val="ED561B"/>
+      </a:accent3>
+      <a:accent4>
+        <a:srgbClr val="EDEF00"/>
+      </a:accent4>
+      <a:accent5>
+        <a:srgbClr val="24CBE5"/>
+      </a:accent5>
+      <a:accent6>
+        <a:srgbClr val="64E572"/>
+      </a:accent6>
+      <a:hlink>
+        <a:srgbClr val="2200CC"/>
+      </a:hlink>
+      <a:folHlink>
+        <a:srgbClr val="551A8B"/>
+      </a:folHlink>
+    </a:clrScheme>
+    <a:fontScheme name="Office">
+      <a:majorFont>
+        <a:latin typeface="Arial"/>
+        <a:ea typeface=""/>
+        <a:cs typeface=""/>
+        <a:font script="Jpan" typeface="ＭＳ Ｐゴシック"/>
+        <a:font script="Hang" typeface="맑은 고딕"/>
+        <a:font script="Hans" typeface="宋体"/>
+        <a:font script="Hant" typeface="新細明體"/>
+        <a:font script="Arab" typeface="Times New Roman"/>
+        <a:font script="Hebr" typeface="Times New Roman"/>
+        <a:font script="Thai" typeface="Angsana New"/>
+        <a:font script="Ethi" typeface="Nyala"/>
+        <a:font script="Beng" typeface="Vrinda"/>
+        <a:font script="Gujr" typeface="Shruti"/>
+        <a:font script="Khmr" typeface="MoolBoran"/>
+        <a:font script="Knda" typeface="Tunga"/>
+        <a:font script="Guru" typeface="Raavi"/>
+        <a:font script="Cans" typeface="Euphemia"/>
+        <a:font script="Cher" typeface="Plantagenet Cherokee"/>
+        <a:font script="Yiii" typeface="Microsoft Yi Baiti"/>
+        <a:font script="Tibt" typeface="Microsoft Himalaya"/>
+        <a:font script="Thaa" typeface="MV Boli"/>
+        <a:font script="Deva" typeface="Mangal"/>
+        <a:font script="Telu" typeface="Gautami"/>
+        <a:font script="Taml" typeface="Latha"/>
+        <a:font script="Syrc" typeface="Estrangelo Edessa"/>
+        <a:font script="Orya" typeface="Kalinga"/>
+        <a:font script="Mlym" typeface="Kartika"/>
+        <a:font script="Laoo" typeface="DokChampa"/>
+        <a:font script="Sinh" typeface="Iskoola Pota"/>
+        <a:font script="Mong" typeface="Mongolian Baiti"/>
+        <a:font script="Viet" typeface="Times New Roman"/>
+        <a:font script="Uigh" typeface="Microsoft Uighur"/>
+        <a:font script="Geor" typeface="Sylfaen"/>
+      </a:majorFont>
+      <a:minorFont>
+        <a:latin typeface="Arial"/>
+        <a:ea typeface=""/>
+        <a:cs typeface=""/>
+        <a:font script="Jpan" typeface="ＭＳ Ｐゴシック"/>
+        <a:font script="Hang" typeface="맑은 고딕"/>
+        <a:font script="Hans" typeface="宋体"/>
+        <a:font script="Hant" typeface="新細明體"/>
+        <a:font script="Arab" typeface="Arial"/>
+        <a:font script="Hebr" typeface="Arial"/>
+        <a:font script="Thai" typeface="Cordia New"/>
+        <a:font script="Ethi" typeface="Nyala"/>
+        <a:font script="Beng" typeface="Vrinda"/>
+        <a:font script="Gujr" typeface="Shruti"/>
+        <a:font script="Khmr" typeface="DaunPenh"/>
+        <a:font script="Knda" typeface="Tunga"/>
+        <a:font script="Guru" typeface="Raavi"/>
+        <a:font script="Cans" typeface="Euphemia"/>
+        <a:font script="Cher" typeface="Plantagenet Cherokee"/>
+        <a:font script="Yiii" typeface="Microsoft Yi Baiti"/>
+        <a:font script="Tibt" typeface="Microsoft Himalaya"/>
+        <a:font script="Thaa" typeface="MV Boli"/>
+        <a:font script="Deva" typeface="Mangal"/>
+        <a:font script="Telu" typeface="Gautami"/>
+        <a:font script="Taml" typeface="Latha"/>
+        <a:font script="Syrc" typeface="Estrangelo Edessa"/>
+        <a:font script="Orya" typeface="Kalinga"/>
+        <a:font script="Mlym" typeface="Kartika"/>
+        <a:font script="Laoo" typeface="DokChampa"/>
+        <a:font script="Sinh" typeface="Iskoola Pota"/>
+        <a:font script="Mong" typeface="Mongolian Baiti"/>
+        <a:font script="Viet" typeface="Arial"/>
+        <a:font script="Uigh" typeface="Microsoft Uighur"/>
+        <a:font script="Geor" typeface="Sylfaen"/>
+      </a:minorFont>
+    </a:fontScheme>
+    <a:fmtScheme name="Office">
+      <a:fillStyleLst>
+        <a:solidFill>
+          <a:schemeClr val="phClr"/>
+        </a:solidFill>
+        <a:gradFill rotWithShape="1">
+          <a:gsLst>
+            <a:gs pos="0">
+              <a:schemeClr val="phClr">
+                <a:tint val="50000"/>
+                <a:satMod val="300000"/>
+              </a:schemeClr>
+            </a:gs>
+            <a:gs pos="35000">
+              <a:schemeClr val="phClr">
+                <a:tint val="37000"/>
+                <a:satMod val="300000"/>
+              </a:schemeClr>
+            </a:gs>
+            <a:gs pos="100000">
+              <a:schemeClr val="phClr">
+                <a:tint val="15000"/>
+                <a:satMod val="350000"/>
+              </a:schemeClr>
+            </a:gs>
+          </a:gsLst>
+          <a:lin ang="16200000" scaled="1"/>
+        </a:gradFill>
+        <a:gradFill rotWithShape="1">
+          <a:gsLst>
+            <a:gs pos="0">
+              <a:schemeClr val="phClr">
+                <a:tint val="100000"/>
+                <a:shade val="100000"/>
+                <a:satMod val="130000"/>
+              </a:schemeClr>
+            </a:gs>
+            <a:gs pos="100000">
+              <a:schemeClr val="phClr">
+                <a:tint val="50000"/>
+                <a:shade val="100000"/>
+                <a:satMod val="350000"/>
+              </a:schemeClr>
+            </a:gs>
+          </a:gsLst>
+          <a:lin ang="16200000" scaled="0"/>
+        </a:gradFill>
+      </a:fillStyleLst>
+      <a:lnStyleLst>
+        <a:ln w="9525" cap="flat" cmpd="sng" algn="ctr">
+          <a:solidFill>
+            <a:schemeClr val="phClr">
+              <a:shade val="95000"/>
+              <a:satMod val="105000"/>
+            </a:schemeClr>
+          </a:solidFill>
+          <a:prstDash val="solid"/>
+        </a:ln>
+        <a:ln w="25400" cap="flat" cmpd="sng" algn="ctr">
+          <a:solidFill>
+            <a:schemeClr val="phClr"/>
+          </a:solidFill>
+          <a:prstDash val="solid"/>
+        </a:ln>
+        <a:ln w="38100" cap="flat" cmpd="sng" algn="ctr">
+          <a:solidFill>
+            <a:schemeClr val="phClr"/>
+          </a:solidFill>
+          <a:prstDash val="solid"/>
+        </a:ln>
+      </a:lnStyleLst>
+      <a:effectStyleLst>
+        <a:effectStyle>
+          <a:effectLst>
+            <a:outerShdw blurRad="40000" dist="20000" dir="5400000" rotWithShape="0">
+              <a:srgbClr val="000000">
+                <a:alpha val="38000"/>
+              </a:srgbClr>
+            </a:outerShdw>
+          </a:effectLst>
+        </a:effectStyle>
+        <a:effectStyle>
+          <a:effectLst>
+            <a:outerShdw blurRad="40000" dist="23000" dir="5400000" rotWithShape="0">
+              <a:srgbClr val="000000">
+                <a:alpha val="35000"/>
+              </a:srgbClr>
+            </a:outerShdw>
+          </a:effectLst>
+        </a:effectStyle>
+        <a:effectStyle>
+          <a:effectLst>
+            <a:outerShdw blurRad="40000" dist="23000" dir="5400000" rotWithShape="0">
+              <a:srgbClr val="000000">
+                <a:alpha val="35000"/>
+              </a:srgbClr>
+            </a:outerShdw>
+          </a:effectLst>
+          <a:scene3d>
+            <a:camera prst="orthographicFront">
+              <a:rot lat="0" lon="0" rev="0"/>
+            </a:camera>
+            <a:lightRig rig="threePt" dir="t">
+              <a:rot lat="0" lon="0" rev="1200000"/>
+            </a:lightRig>
+          </a:scene3d>
+          <a:sp3d>
+            <a:bevelT w="63500" h="25400"/>
+          </a:sp3d>
+        </a:effectStyle>
+      </a:effectStyleLst>
+      <a:bgFillStyleLst>
+        <a:solidFill>
+          <a:schemeClr val="phClr"/>
+        </a:solidFill>
+        <a:gradFill rotWithShape="1">
+          <a:gsLst>
+            <a:gs pos="0">
+              <a:schemeClr val="phClr">
+                <a:tint val="40000"/>
+                <a:satMod val="350000"/>
+              </a:schemeClr>
+            </a:gs>
+            <a:gs pos="40000">
+              <a:schemeClr val="phClr">
+                <a:tint val="45000"/>
+                <a:shade val="99000"/>
+                <a:satMod val="350000"/>
+              </a:schemeClr>
+            </a:gs>
+            <a:gs pos="100000">
+              <a:schemeClr val="phClr">
+                <a:shade val="20000"/>
+                <a:satMod val="255000"/>
+              </a:schemeClr>
+            </a:gs>
+          </a:gsLst>
+          <a:path path="circle">
+            <a:fillToRect l="50000" t="-80000" r="50000" b="180000"/>
+          </a:path>
+        </a:gradFill>
+        <a:gradFill rotWithShape="1">
+          <a:gsLst>
+            <a:gs pos="0">
+              <a:schemeClr val="phClr">
+                <a:tint val="80000"/>
+                <a:satMod val="300000"/>
+              </a:schemeClr>
+            </a:gs>
+            <a:gs pos="100000">
+              <a:schemeClr val="phClr">
+                <a:shade val="30000"/>
+                <a:satMod val="200000"/>
+              </a:schemeClr>
+            </a:gs>
+          </a:gsLst>
+          <a:path path="circle">
+            <a:fillToRect l="50000" t="50000" r="50000" b="50000"/>
+          </a:path>
+        </a:gradFill>
+      </a:bgFillStyleLst>
+    </a:fmtScheme>
+  </a:themeElements>
+</a:theme>
+</file>
+
+<file path=ppt/theme/theme2.xml><?xml version="1.0" encoding="utf-8"?>
 <a:theme xmlns:a="http://schemas.openxmlformats.org/drawingml/2006/main" xmlns:r="http://schemas.openxmlformats.org/officeDocument/2006/relationships" name="Simple Light">
   <a:themeElements>
     <a:clrScheme name="Simple Light">
@@ -23453,283 +24331,4 @@
     </a:fmtScheme>
   </a:themeElements>
 </a:theme>
-</file>
-
-<file path=ppt/theme/theme2.xml><?xml version="1.0" encoding="utf-8"?>
-<a:theme xmlns:a="http://schemas.openxmlformats.org/drawingml/2006/main" xmlns:r="http://schemas.openxmlformats.org/officeDocument/2006/relationships">
-  <a:themeElements>
-    <a:clrScheme name="Default">
-      <a:dk1>
-        <a:srgbClr val="000000"/>
-      </a:dk1>
-      <a:lt1>
-        <a:srgbClr val="FFFFFF"/>
-      </a:lt1>
-      <a:dk2>
-        <a:srgbClr val="158158"/>
-      </a:dk2>
-      <a:lt2>
-        <a:srgbClr val="F3F3F3"/>
-      </a:lt2>
-      <a:accent1>
-        <a:srgbClr val="058DC7"/>
-      </a:accent1>
-      <a:accent2>
-        <a:srgbClr val="50B432"/>
-      </a:accent2>
-      <a:accent3>
-        <a:srgbClr val="ED561B"/>
-      </a:accent3>
-      <a:accent4>
-        <a:srgbClr val="EDEF00"/>
-      </a:accent4>
-      <a:accent5>
-        <a:srgbClr val="24CBE5"/>
-      </a:accent5>
-      <a:accent6>
-        <a:srgbClr val="64E572"/>
-      </a:accent6>
-      <a:hlink>
-        <a:srgbClr val="2200CC"/>
-      </a:hlink>
-      <a:folHlink>
-        <a:srgbClr val="551A8B"/>
-      </a:folHlink>
-    </a:clrScheme>
-    <a:fontScheme name="Office">
-      <a:majorFont>
-        <a:latin typeface="Arial"/>
-        <a:ea typeface=""/>
-        <a:cs typeface=""/>
-        <a:font script="Jpan" typeface="ＭＳ Ｐゴシック"/>
-        <a:font script="Hang" typeface="맑은 고딕"/>
-        <a:font script="Hans" typeface="宋体"/>
-        <a:font script="Hant" typeface="新細明體"/>
-        <a:font script="Arab" typeface="Times New Roman"/>
-        <a:font script="Hebr" typeface="Times New Roman"/>
-        <a:font script="Thai" typeface="Angsana New"/>
-        <a:font script="Ethi" typeface="Nyala"/>
-        <a:font script="Beng" typeface="Vrinda"/>
-        <a:font script="Gujr" typeface="Shruti"/>
-        <a:font script="Khmr" typeface="MoolBoran"/>
-        <a:font script="Knda" typeface="Tunga"/>
-        <a:font script="Guru" typeface="Raavi"/>
-        <a:font script="Cans" typeface="Euphemia"/>
-        <a:font script="Cher" typeface="Plantagenet Cherokee"/>
-        <a:font script="Yiii" typeface="Microsoft Yi Baiti"/>
-        <a:font script="Tibt" typeface="Microsoft Himalaya"/>
-        <a:font script="Thaa" typeface="MV Boli"/>
-        <a:font script="Deva" typeface="Mangal"/>
-        <a:font script="Telu" typeface="Gautami"/>
-        <a:font script="Taml" typeface="Latha"/>
-        <a:font script="Syrc" typeface="Estrangelo Edessa"/>
-        <a:font script="Orya" typeface="Kalinga"/>
-        <a:font script="Mlym" typeface="Kartika"/>
-        <a:font script="Laoo" typeface="DokChampa"/>
-        <a:font script="Sinh" typeface="Iskoola Pota"/>
-        <a:font script="Mong" typeface="Mongolian Baiti"/>
-        <a:font script="Viet" typeface="Times New Roman"/>
-        <a:font script="Uigh" typeface="Microsoft Uighur"/>
-        <a:font script="Geor" typeface="Sylfaen"/>
-      </a:majorFont>
-      <a:minorFont>
-        <a:latin typeface="Arial"/>
-        <a:ea typeface=""/>
-        <a:cs typeface=""/>
-        <a:font script="Jpan" typeface="ＭＳ Ｐゴシック"/>
-        <a:font script="Hang" typeface="맑은 고딕"/>
-        <a:font script="Hans" typeface="宋体"/>
-        <a:font script="Hant" typeface="新細明體"/>
-        <a:font script="Arab" typeface="Arial"/>
-        <a:font script="Hebr" typeface="Arial"/>
-        <a:font script="Thai" typeface="Cordia New"/>
-        <a:font script="Ethi" typeface="Nyala"/>
-        <a:font script="Beng" typeface="Vrinda"/>
-        <a:font script="Gujr" typeface="Shruti"/>
-        <a:font script="Khmr" typeface="DaunPenh"/>
-        <a:font script="Knda" typeface="Tunga"/>
-        <a:font script="Guru" typeface="Raavi"/>
-        <a:font script="Cans" typeface="Euphemia"/>
-        <a:font script="Cher" typeface="Plantagenet Cherokee"/>
-        <a:font script="Yiii" typeface="Microsoft Yi Baiti"/>
-        <a:font script="Tibt" typeface="Microsoft Himalaya"/>
-        <a:font script="Thaa" typeface="MV Boli"/>
-        <a:font script="Deva" typeface="Mangal"/>
-        <a:font script="Telu" typeface="Gautami"/>
-        <a:font script="Taml" typeface="Latha"/>
-        <a:font script="Syrc" typeface="Estrangelo Edessa"/>
-        <a:font script="Orya" typeface="Kalinga"/>
-        <a:font script="Mlym" typeface="Kartika"/>
-        <a:font script="Laoo" typeface="DokChampa"/>
-        <a:font script="Sinh" typeface="Iskoola Pota"/>
-        <a:font script="Mong" typeface="Mongolian Baiti"/>
-        <a:font script="Viet" typeface="Arial"/>
-        <a:font script="Uigh" typeface="Microsoft Uighur"/>
-        <a:font script="Geor" typeface="Sylfaen"/>
-      </a:minorFont>
-    </a:fontScheme>
-    <a:fmtScheme name="Office">
-      <a:fillStyleLst>
-        <a:solidFill>
-          <a:schemeClr val="phClr"/>
-        </a:solidFill>
-        <a:gradFill rotWithShape="1">
-          <a:gsLst>
-            <a:gs pos="0">
-              <a:schemeClr val="phClr">
-                <a:tint val="50000"/>
-                <a:satMod val="300000"/>
-              </a:schemeClr>
-            </a:gs>
-            <a:gs pos="35000">
-              <a:schemeClr val="phClr">
-                <a:tint val="37000"/>
-                <a:satMod val="300000"/>
-              </a:schemeClr>
-            </a:gs>
-            <a:gs pos="100000">
-              <a:schemeClr val="phClr">
-                <a:tint val="15000"/>
-                <a:satMod val="350000"/>
-              </a:schemeClr>
-            </a:gs>
-          </a:gsLst>
-          <a:lin ang="16200000" scaled="1"/>
-        </a:gradFill>
-        <a:gradFill rotWithShape="1">
-          <a:gsLst>
-            <a:gs pos="0">
-              <a:schemeClr val="phClr">
-                <a:tint val="100000"/>
-                <a:shade val="100000"/>
-                <a:satMod val="130000"/>
-              </a:schemeClr>
-            </a:gs>
-            <a:gs pos="100000">
-              <a:schemeClr val="phClr">
-                <a:tint val="50000"/>
-                <a:shade val="100000"/>
-                <a:satMod val="350000"/>
-              </a:schemeClr>
-            </a:gs>
-          </a:gsLst>
-          <a:lin ang="16200000" scaled="0"/>
-        </a:gradFill>
-      </a:fillStyleLst>
-      <a:lnStyleLst>
-        <a:ln w="9525" cap="flat" cmpd="sng" algn="ctr">
-          <a:solidFill>
-            <a:schemeClr val="phClr">
-              <a:shade val="95000"/>
-              <a:satMod val="105000"/>
-            </a:schemeClr>
-          </a:solidFill>
-          <a:prstDash val="solid"/>
-        </a:ln>
-        <a:ln w="25400" cap="flat" cmpd="sng" algn="ctr">
-          <a:solidFill>
-            <a:schemeClr val="phClr"/>
-          </a:solidFill>
-          <a:prstDash val="solid"/>
-        </a:ln>
-        <a:ln w="38100" cap="flat" cmpd="sng" algn="ctr">
-          <a:solidFill>
-            <a:schemeClr val="phClr"/>
-          </a:solidFill>
-          <a:prstDash val="solid"/>
-        </a:ln>
-      </a:lnStyleLst>
-      <a:effectStyleLst>
-        <a:effectStyle>
-          <a:effectLst>
-            <a:outerShdw blurRad="40000" dist="20000" dir="5400000" rotWithShape="0">
-              <a:srgbClr val="000000">
-                <a:alpha val="38000"/>
-              </a:srgbClr>
-            </a:outerShdw>
-          </a:effectLst>
-        </a:effectStyle>
-        <a:effectStyle>
-          <a:effectLst>
-            <a:outerShdw blurRad="40000" dist="23000" dir="5400000" rotWithShape="0">
-              <a:srgbClr val="000000">
-                <a:alpha val="35000"/>
-              </a:srgbClr>
-            </a:outerShdw>
-          </a:effectLst>
-        </a:effectStyle>
-        <a:effectStyle>
-          <a:effectLst>
-            <a:outerShdw blurRad="40000" dist="23000" dir="5400000" rotWithShape="0">
-              <a:srgbClr val="000000">
-                <a:alpha val="35000"/>
-              </a:srgbClr>
-            </a:outerShdw>
-          </a:effectLst>
-          <a:scene3d>
-            <a:camera prst="orthographicFront">
-              <a:rot lat="0" lon="0" rev="0"/>
-            </a:camera>
-            <a:lightRig rig="threePt" dir="t">
-              <a:rot lat="0" lon="0" rev="1200000"/>
-            </a:lightRig>
-          </a:scene3d>
-          <a:sp3d>
-            <a:bevelT w="63500" h="25400"/>
-          </a:sp3d>
-        </a:effectStyle>
-      </a:effectStyleLst>
-      <a:bgFillStyleLst>
-        <a:solidFill>
-          <a:schemeClr val="phClr"/>
-        </a:solidFill>
-        <a:gradFill rotWithShape="1">
-          <a:gsLst>
-            <a:gs pos="0">
-              <a:schemeClr val="phClr">
-                <a:tint val="40000"/>
-                <a:satMod val="350000"/>
-              </a:schemeClr>
-            </a:gs>
-            <a:gs pos="40000">
-              <a:schemeClr val="phClr">
-                <a:tint val="45000"/>
-                <a:shade val="99000"/>
-                <a:satMod val="350000"/>
-              </a:schemeClr>
-            </a:gs>
-            <a:gs pos="100000">
-              <a:schemeClr val="phClr">
-                <a:shade val="20000"/>
-                <a:satMod val="255000"/>
-              </a:schemeClr>
-            </a:gs>
-          </a:gsLst>
-          <a:path path="circle">
-            <a:fillToRect l="50000" t="-80000" r="50000" b="180000"/>
-          </a:path>
-        </a:gradFill>
-        <a:gradFill rotWithShape="1">
-          <a:gsLst>
-            <a:gs pos="0">
-              <a:schemeClr val="phClr">
-                <a:tint val="80000"/>
-                <a:satMod val="300000"/>
-              </a:schemeClr>
-            </a:gs>
-            <a:gs pos="100000">
-              <a:schemeClr val="phClr">
-                <a:shade val="30000"/>
-                <a:satMod val="200000"/>
-              </a:schemeClr>
-            </a:gs>
-          </a:gsLst>
-          <a:path path="circle">
-            <a:fillToRect l="50000" t="50000" r="50000" b="50000"/>
-          </a:path>
-        </a:gradFill>
-      </a:bgFillStyleLst>
-    </a:fmtScheme>
-  </a:themeElements>
-</a:theme>
 </file>
</xml_diff>